<commit_message>
s3, glacier, storage added
</commit_message>
<xml_diff>
--- a/AWS_Solution_Architect.pptx
+++ b/AWS_Solution_Architect.pptx
@@ -5,26 +5,42 @@
     <p:sldMasterId id="2147483732" r:id="rId1"/>
   </p:sldMasterIdLst>
   <p:notesMasterIdLst>
-    <p:notesMasterId r:id="rId19"/>
+    <p:notesMasterId r:id="rId35"/>
   </p:notesMasterIdLst>
   <p:sldIdLst>
     <p:sldId id="256" r:id="rId2"/>
     <p:sldId id="257" r:id="rId3"/>
-    <p:sldId id="275" r:id="rId4"/>
-    <p:sldId id="270" r:id="rId5"/>
-    <p:sldId id="279" r:id="rId6"/>
-    <p:sldId id="274" r:id="rId7"/>
-    <p:sldId id="276" r:id="rId8"/>
-    <p:sldId id="271" r:id="rId9"/>
-    <p:sldId id="272" r:id="rId10"/>
-    <p:sldId id="273" r:id="rId11"/>
-    <p:sldId id="277" r:id="rId12"/>
-    <p:sldId id="278" r:id="rId13"/>
-    <p:sldId id="280" r:id="rId14"/>
-    <p:sldId id="281" r:id="rId15"/>
-    <p:sldId id="282" r:id="rId16"/>
-    <p:sldId id="283" r:id="rId17"/>
-    <p:sldId id="269" r:id="rId18"/>
+    <p:sldId id="288" r:id="rId4"/>
+    <p:sldId id="291" r:id="rId5"/>
+    <p:sldId id="275" r:id="rId6"/>
+    <p:sldId id="270" r:id="rId7"/>
+    <p:sldId id="279" r:id="rId8"/>
+    <p:sldId id="274" r:id="rId9"/>
+    <p:sldId id="276" r:id="rId10"/>
+    <p:sldId id="271" r:id="rId11"/>
+    <p:sldId id="290" r:id="rId12"/>
+    <p:sldId id="272" r:id="rId13"/>
+    <p:sldId id="273" r:id="rId14"/>
+    <p:sldId id="277" r:id="rId15"/>
+    <p:sldId id="278" r:id="rId16"/>
+    <p:sldId id="280" r:id="rId17"/>
+    <p:sldId id="281" r:id="rId18"/>
+    <p:sldId id="282" r:id="rId19"/>
+    <p:sldId id="283" r:id="rId20"/>
+    <p:sldId id="289" r:id="rId21"/>
+    <p:sldId id="284" r:id="rId22"/>
+    <p:sldId id="285" r:id="rId23"/>
+    <p:sldId id="286" r:id="rId24"/>
+    <p:sldId id="287" r:id="rId25"/>
+    <p:sldId id="292" r:id="rId26"/>
+    <p:sldId id="293" r:id="rId27"/>
+    <p:sldId id="294" r:id="rId28"/>
+    <p:sldId id="295" r:id="rId29"/>
+    <p:sldId id="296" r:id="rId30"/>
+    <p:sldId id="297" r:id="rId31"/>
+    <p:sldId id="298" r:id="rId32"/>
+    <p:sldId id="299" r:id="rId33"/>
+    <p:sldId id="269" r:id="rId34"/>
   </p:sldIdLst>
   <p:sldSz cx="9144000" cy="6858000" type="screen4x3"/>
   <p:notesSz cx="6858000" cy="9144000"/>
@@ -214,7 +230,7 @@
           <a:p>
             <a:fld id="{93500CC2-B2B2-4C5E-B2DB-AB390A470EA1}" type="datetimeFigureOut">
               <a:rPr lang="en-GB" smtClean="0"/>
-              <a:t>21/07/2017</a:t>
+              <a:t>27/07/2017</a:t>
             </a:fld>
             <a:endParaRPr lang="en-GB"/>
           </a:p>
@@ -573,7 +589,7 @@
           <a:p>
             <a:fld id="{D80AF7CB-9F6B-45E2-A674-C11D9BA90EBA}" type="slidenum">
               <a:rPr lang="en-GB" smtClean="0"/>
-              <a:t>11</a:t>
+              <a:t>14</a:t>
             </a:fld>
             <a:endParaRPr lang="en-GB"/>
           </a:p>
@@ -780,7 +796,7 @@
           <a:p>
             <a:fld id="{8F235549-BF0A-4B98-8561-3786244E808C}" type="datetimeFigureOut">
               <a:rPr lang="en-US" smtClean="0"/>
-              <a:t>7/21/2017</a:t>
+              <a:t>7/27/2017</a:t>
             </a:fld>
             <a:endParaRPr lang="en-US"/>
           </a:p>
@@ -980,7 +996,7 @@
           <a:p>
             <a:fld id="{8F235549-BF0A-4B98-8561-3786244E808C}" type="datetimeFigureOut">
               <a:rPr lang="en-US" smtClean="0"/>
-              <a:t>7/21/2017</a:t>
+              <a:t>7/27/2017</a:t>
             </a:fld>
             <a:endParaRPr lang="en-US"/>
           </a:p>
@@ -1155,7 +1171,7 @@
           <a:p>
             <a:fld id="{8F235549-BF0A-4B98-8561-3786244E808C}" type="datetimeFigureOut">
               <a:rPr lang="en-US" smtClean="0"/>
-              <a:t>7/21/2017</a:t>
+              <a:t>7/27/2017</a:t>
             </a:fld>
             <a:endParaRPr lang="en-US"/>
           </a:p>
@@ -1320,7 +1336,7 @@
           <a:p>
             <a:fld id="{8F235549-BF0A-4B98-8561-3786244E808C}" type="datetimeFigureOut">
               <a:rPr lang="en-US" smtClean="0"/>
-              <a:t>7/21/2017</a:t>
+              <a:t>7/27/2017</a:t>
             </a:fld>
             <a:endParaRPr lang="en-US"/>
           </a:p>
@@ -1568,7 +1584,7 @@
           <a:p>
             <a:fld id="{8F235549-BF0A-4B98-8561-3786244E808C}" type="datetimeFigureOut">
               <a:rPr lang="en-US" smtClean="0"/>
-              <a:t>7/21/2017</a:t>
+              <a:t>7/27/2017</a:t>
             </a:fld>
             <a:endParaRPr lang="en-US"/>
           </a:p>
@@ -1886,7 +1902,7 @@
           <a:p>
             <a:fld id="{8F235549-BF0A-4B98-8561-3786244E808C}" type="datetimeFigureOut">
               <a:rPr lang="en-US" smtClean="0"/>
-              <a:t>7/21/2017</a:t>
+              <a:t>7/27/2017</a:t>
             </a:fld>
             <a:endParaRPr lang="en-US"/>
           </a:p>
@@ -2352,7 +2368,7 @@
           <a:p>
             <a:fld id="{8F235549-BF0A-4B98-8561-3786244E808C}" type="datetimeFigureOut">
               <a:rPr lang="en-US" smtClean="0"/>
-              <a:t>7/21/2017</a:t>
+              <a:t>7/27/2017</a:t>
             </a:fld>
             <a:endParaRPr lang="en-US"/>
           </a:p>
@@ -2500,7 +2516,7 @@
           <a:p>
             <a:fld id="{8F235549-BF0A-4B98-8561-3786244E808C}" type="datetimeFigureOut">
               <a:rPr lang="en-US" smtClean="0"/>
-              <a:t>7/21/2017</a:t>
+              <a:t>7/27/2017</a:t>
             </a:fld>
             <a:endParaRPr lang="en-US"/>
           </a:p>
@@ -2590,7 +2606,7 @@
           <a:p>
             <a:fld id="{8F235549-BF0A-4B98-8561-3786244E808C}" type="datetimeFigureOut">
               <a:rPr lang="en-US" smtClean="0"/>
-              <a:t>7/21/2017</a:t>
+              <a:t>7/27/2017</a:t>
             </a:fld>
             <a:endParaRPr lang="en-US"/>
           </a:p>
@@ -2864,7 +2880,7 @@
           <a:p>
             <a:fld id="{8F235549-BF0A-4B98-8561-3786244E808C}" type="datetimeFigureOut">
               <a:rPr lang="en-US" smtClean="0"/>
-              <a:t>7/21/2017</a:t>
+              <a:t>7/27/2017</a:t>
             </a:fld>
             <a:endParaRPr lang="en-US"/>
           </a:p>
@@ -3169,7 +3185,7 @@
           <a:p>
             <a:fld id="{8F235549-BF0A-4B98-8561-3786244E808C}" type="datetimeFigureOut">
               <a:rPr lang="en-US" smtClean="0"/>
-              <a:t>7/21/2017</a:t>
+              <a:t>7/27/2017</a:t>
             </a:fld>
             <a:endParaRPr lang="en-US"/>
           </a:p>
@@ -3467,7 +3483,7 @@
           <a:p>
             <a:fld id="{8F235549-BF0A-4B98-8561-3786244E808C}" type="datetimeFigureOut">
               <a:rPr lang="en-US" smtClean="0"/>
-              <a:t>7/21/2017</a:t>
+              <a:t>7/27/2017</a:t>
             </a:fld>
             <a:endParaRPr lang="en-US"/>
           </a:p>
@@ -3941,7 +3957,7 @@
           <a:p>
             <a:r>
               <a:rPr lang="en-US" dirty="0" smtClean="0"/>
-              <a:t>CloudTrail</a:t>
+              <a:t>Auto Scaling</a:t>
             </a:r>
             <a:endParaRPr lang="en-US" dirty="0"/>
           </a:p>
@@ -3965,29 +3981,120 @@
           <a:lstStyle/>
           <a:p>
             <a:r>
-              <a:rPr lang="en-GB" sz="1400" dirty="0"/>
-              <a:t>CloudTrail integration with CloudWatch Logs delivers API activity captured by CloudTrail to a </a:t>
-            </a:r>
-            <a:r>
               <a:rPr lang="en-GB" sz="1400" b="1" dirty="0"/>
-              <a:t>CloudWatch Logs log stream </a:t>
-            </a:r>
-            <a:r>
-              <a:rPr lang="en-GB" sz="1400" dirty="0"/>
-              <a:t>in the CloudWatch Logs log group you </a:t>
+              <a:t>Availability Zone Rebalancing </a:t>
+            </a:r>
+            <a:r>
+              <a:rPr lang="en-GB" sz="1400" b="1" dirty="0" smtClean="0"/>
+              <a:t>process (</a:t>
+            </a:r>
+            <a:r>
+              <a:rPr lang="en-GB" sz="1400" b="1" dirty="0" err="1"/>
+              <a:t>AZRebalance</a:t>
+            </a:r>
+            <a:r>
+              <a:rPr lang="en-GB" sz="1400" b="1" dirty="0" smtClean="0"/>
+              <a:t>)</a:t>
             </a:r>
             <a:r>
               <a:rPr lang="en-GB" sz="1400" dirty="0" smtClean="0"/>
-              <a:t>specify</a:t>
-            </a:r>
-            <a:endParaRPr lang="en-GB" sz="1400" dirty="0"/>
+              <a:t> - </a:t>
+            </a:r>
+            <a:r>
+              <a:rPr lang="en-GB" sz="1400" dirty="0"/>
+              <a:t>Auto Scaling performs various processes, such as Launch, Terminate, and Availability Zone Rebalance (</a:t>
+            </a:r>
+            <a:r>
+              <a:rPr lang="en-GB" sz="1400" dirty="0" err="1"/>
+              <a:t>AZRebalance</a:t>
+            </a:r>
+            <a:r>
+              <a:rPr lang="en-GB" sz="1400" dirty="0"/>
+              <a:t>). The </a:t>
+            </a:r>
+            <a:r>
+              <a:rPr lang="en-GB" sz="1400" dirty="0" err="1"/>
+              <a:t>AZRebalance</a:t>
+            </a:r>
+            <a:r>
+              <a:rPr lang="en-GB" sz="1400" dirty="0"/>
+              <a:t> process type seeks to maintain a balanced number of instances across Availability Zones within a region. If the user suspends the Terminate process, the </a:t>
+            </a:r>
+            <a:r>
+              <a:rPr lang="en-GB" sz="1400" dirty="0" err="1"/>
+              <a:t>AZRebalance</a:t>
+            </a:r>
+            <a:r>
+              <a:rPr lang="en-GB" sz="1400" dirty="0"/>
+              <a:t> process can cause the Auto Scaling group to grow up to ten percent larger than the maximum size. This is because Auto Scaling allows groups to temporarily grow larger than the maximum size during rebalancing activities. If Auto Scaling cannot terminate instances, the Auto Scaling group could remain up to </a:t>
+            </a:r>
+            <a:r>
+              <a:rPr lang="en-GB" sz="1400" dirty="0">
+                <a:solidFill>
+                  <a:srgbClr val="FF0000"/>
+                </a:solidFill>
+              </a:rPr>
+              <a:t>ten percent larger </a:t>
+            </a:r>
+            <a:r>
+              <a:rPr lang="en-GB" sz="1400" dirty="0"/>
+              <a:t>than the maximum size until the user resumes the Terminate process type.  </a:t>
+            </a:r>
+            <a:endParaRPr lang="en-GB" sz="1400" dirty="0" smtClean="0"/>
+          </a:p>
+          <a:p>
+            <a:r>
+              <a:rPr lang="en-GB" sz="1400" dirty="0" smtClean="0"/>
+              <a:t>Auto scaling can be terminated temporarily </a:t>
+            </a:r>
+          </a:p>
+          <a:p>
+            <a:r>
+              <a:rPr lang="en-GB" sz="1400" dirty="0"/>
+              <a:t>When rebalancing, Auto Scaling launches new instances before terminating the old ones, so that rebalancing does not compromise the performance or availability of your application. Because Auto Scaling attempts to launch new instances before terminating the old ones, being at or near the specified maximum capacity could impede or completely halt rebalancing activities. To avoid this problem, the system can temporarily exceed the specified maximum capacity of a group by a </a:t>
+            </a:r>
+            <a:r>
+              <a:rPr lang="en-GB" sz="1400" b="1" dirty="0">
+                <a:solidFill>
+                  <a:srgbClr val="00B050"/>
+                </a:solidFill>
+              </a:rPr>
+              <a:t>10 percent margin</a:t>
+            </a:r>
+            <a:r>
+              <a:rPr lang="en-GB" sz="1400" dirty="0"/>
+              <a:t> (or by a 1-instance margin, whichever is greater) during a rebalancing activity</a:t>
+            </a:r>
+            <a:r>
+              <a:rPr lang="en-GB" sz="1400" dirty="0" smtClean="0"/>
+              <a:t>.</a:t>
+            </a:r>
+          </a:p>
+          <a:p>
+            <a:r>
+              <a:rPr lang="en-GB" sz="1400" dirty="0"/>
+              <a:t>Auto Scaling can automatically </a:t>
+            </a:r>
+            <a:r>
+              <a:rPr lang="en-GB" sz="1400" b="1" dirty="0">
+                <a:solidFill>
+                  <a:srgbClr val="00B050"/>
+                </a:solidFill>
+              </a:rPr>
+              <a:t>maintain capacity</a:t>
+            </a:r>
+            <a:endParaRPr lang="en-GB" sz="1400" b="1" dirty="0">
+              <a:solidFill>
+                <a:srgbClr val="00B050"/>
+              </a:solidFill>
+            </a:endParaRPr>
           </a:p>
         </p:txBody>
       </p:sp>
     </p:spTree>
     <p:extLst>
       <p:ext uri="{BB962C8B-B14F-4D97-AF65-F5344CB8AC3E}">
-        <p14:creationId xmlns:p14="http://schemas.microsoft.com/office/powerpoint/2010/main" val="4254879350"/>
+        <p14:creationId xmlns:p14="http://schemas.microsoft.com/office/powerpoint/2010/main" val="562292818"/>
       </p:ext>
     </p:extLst>
   </p:cSld>
@@ -4038,7 +4145,7 @@
           <a:p>
             <a:r>
               <a:rPr lang="en-US" dirty="0" smtClean="0"/>
-              <a:t>Amazon RDS</a:t>
+              <a:t>Auto Scaling</a:t>
             </a:r>
             <a:endParaRPr lang="en-US" dirty="0"/>
           </a:p>
@@ -4062,38 +4169,45 @@
           <a:lstStyle/>
           <a:p>
             <a:r>
-              <a:rPr lang="en-GB" sz="1400" dirty="0"/>
-              <a:t>Before launching actual RDS instances, you need to configure a </a:t>
-            </a:r>
+              <a:rPr lang="en-GB" sz="1400" b="1" dirty="0" smtClean="0"/>
+              <a:t>Groups:-</a:t>
+            </a:r>
+            <a:r>
+              <a:rPr lang="en-GB" sz="1400" dirty="0" smtClean="0"/>
+              <a:t> Your </a:t>
+            </a:r>
+            <a:r>
+              <a:rPr lang="en-GB" sz="1400" dirty="0"/>
+              <a:t>EC2 instances are organized into groups so that they can be treated as a logical unit for the purposes of scaling and management. When you create a group, you can specify its minimum, maximum, and, desired number of EC2 instances. </a:t>
+            </a:r>
+          </a:p>
+          <a:p>
             <a:r>
               <a:rPr lang="en-GB" sz="1400" b="1" dirty="0"/>
-              <a:t>DB Subnet </a:t>
+              <a:t>Launch </a:t>
             </a:r>
             <a:r>
               <a:rPr lang="en-GB" sz="1400" b="1" dirty="0" smtClean="0"/>
-              <a:t>Group</a:t>
-            </a:r>
-          </a:p>
-          <a:p>
-            <a:r>
-              <a:rPr lang="en-GB" sz="1400" dirty="0"/>
-              <a:t>A </a:t>
-            </a:r>
-            <a:r>
-              <a:rPr lang="en-GB" sz="1400" b="1" dirty="0"/>
-              <a:t>DB Subnet Group</a:t>
-            </a:r>
-            <a:r>
-              <a:rPr lang="en-GB" sz="1400" dirty="0"/>
-              <a:t> is a collection of subnets (typically private) that you create in a VPC and designate for your DB instances</a:t>
+              <a:t>configurations:-</a:t>
             </a:r>
             <a:r>
               <a:rPr lang="en-GB" sz="1400" dirty="0" smtClean="0"/>
-              <a:t>. </a:t>
-            </a:r>
-            <a:r>
-              <a:rPr lang="en-GB" sz="1400" dirty="0"/>
-              <a:t>Each DB subnet group should have subnets in at least two Availability Zones in a given region. Note that SQL Server Mirroring with a SQL Server DB instance requires at least 3 subnets in distinct Availability Zones</a:t>
+              <a:t> Your </a:t>
+            </a:r>
+            <a:r>
+              <a:rPr lang="en-GB" sz="1400" dirty="0"/>
+              <a:t>group uses a launch configuration as a template for its EC2 instances. When you create a launch configuration, you can specify information such as the AMI ID, instance type, key pair, security groups, and block device mapping for your instances. </a:t>
+            </a:r>
+            <a:endParaRPr lang="en-GB" sz="1400" dirty="0" smtClean="0"/>
+          </a:p>
+          <a:p>
+            <a:r>
+              <a:rPr lang="en-GB" sz="1400" dirty="0" smtClean="0"/>
+              <a:t>When </a:t>
+            </a:r>
+            <a:r>
+              <a:rPr lang="en-GB" sz="1400" dirty="0"/>
+              <a:t>auto scaling, each instance is guaranteed to be just like the last one. It's repeatable, scalable, and reliable</a:t>
             </a:r>
             <a:r>
               <a:rPr lang="en-GB" sz="1400" dirty="0" smtClean="0"/>
@@ -4103,49 +4217,19 @@
           <a:p>
             <a:r>
               <a:rPr lang="en-GB" sz="1400" dirty="0"/>
-              <a:t>When Amazon RDS creates a DB instance in a VPC, it assigns a </a:t>
-            </a:r>
-            <a:r>
-              <a:rPr lang="en-GB" sz="1400" b="1" dirty="0"/>
-              <a:t>network interface </a:t>
-            </a:r>
-            <a:r>
-              <a:rPr lang="en-GB" sz="1400" dirty="0"/>
-              <a:t>to your DB instance by using an </a:t>
-            </a:r>
-            <a:r>
-              <a:rPr lang="en-GB" sz="1400" b="1" dirty="0"/>
-              <a:t>IP address selected </a:t>
-            </a:r>
-            <a:r>
-              <a:rPr lang="en-GB" sz="1400" dirty="0"/>
-              <a:t>from your DB Subnet Group. If the primary DB instance of a Multi-AZ deployment fails, Amazon RDS can promote the corresponding standby and subsequently create a new standby using an IP address from an assigned subnet in one of the other Availability Zones</a:t>
-            </a:r>
-            <a:r>
-              <a:rPr lang="en-GB" sz="1400" dirty="0" smtClean="0"/>
-              <a:t>.</a:t>
-            </a:r>
-          </a:p>
-          <a:p>
-            <a:r>
-              <a:rPr lang="en-GB" sz="1400" dirty="0"/>
-              <a:t>The rules of a </a:t>
-            </a:r>
-            <a:r>
-              <a:rPr lang="en-GB" sz="1400" b="1" dirty="0"/>
-              <a:t>Security Group</a:t>
-            </a:r>
-            <a:r>
-              <a:rPr lang="en-GB" sz="1400" dirty="0"/>
-              <a:t> control the inbound traffic that's allowed to reach the instances that are associated with the security group and the outbound traffic that's allowed to leave them. By </a:t>
-            </a:r>
-            <a:r>
-              <a:rPr lang="en-GB" sz="1400" b="1" dirty="0"/>
-              <a:t>default</a:t>
-            </a:r>
-            <a:r>
-              <a:rPr lang="en-GB" sz="1400" dirty="0"/>
-              <a:t>, security groups allow all outbound traffic and deny all inbound traffic.</a:t>
+              <a:t>When you create your Auto Scaling group, you must associate it with a Launch Configuration. You can attach </a:t>
+            </a:r>
+            <a:r>
+              <a:rPr lang="en-GB" sz="1400" b="1" dirty="0">
+                <a:solidFill>
+                  <a:srgbClr val="00B050"/>
+                </a:solidFill>
+              </a:rPr>
+              <a:t>only one Launch Configuration to an Auto Scaling group </a:t>
+            </a:r>
+            <a:r>
+              <a:rPr lang="en-GB" sz="1400" dirty="0"/>
+              <a:t>at a time and it cannot be modified.</a:t>
             </a:r>
           </a:p>
         </p:txBody>
@@ -4153,7 +4237,7 @@
     </p:spTree>
     <p:extLst>
       <p:ext uri="{BB962C8B-B14F-4D97-AF65-F5344CB8AC3E}">
-        <p14:creationId xmlns:p14="http://schemas.microsoft.com/office/powerpoint/2010/main" val="1745718939"/>
+        <p14:creationId xmlns:p14="http://schemas.microsoft.com/office/powerpoint/2010/main" val="4056629263"/>
       </p:ext>
     </p:extLst>
   </p:cSld>
@@ -4204,7 +4288,7 @@
           <a:p>
             <a:r>
               <a:rPr lang="en-US" dirty="0" smtClean="0"/>
-              <a:t>Subnet</a:t>
+              <a:t>Elastic IP Address</a:t>
             </a:r>
             <a:endParaRPr lang="en-US" dirty="0"/>
           </a:p>
@@ -4228,24 +4312,12 @@
           <a:lstStyle/>
           <a:p>
             <a:r>
-              <a:rPr lang="en-GB" sz="1400" b="1" dirty="0"/>
-              <a:t>Subnets</a:t>
-            </a:r>
-            <a:r>
-              <a:rPr lang="en-GB" sz="1400" dirty="0"/>
-              <a:t> are segments of a VPC's IP address range that allow you </a:t>
-            </a:r>
-            <a:r>
-              <a:rPr lang="en-GB" sz="1400" b="1" dirty="0"/>
-              <a:t>to group your resources </a:t>
-            </a:r>
-            <a:r>
-              <a:rPr lang="en-GB" sz="1400" dirty="0"/>
-              <a:t>based on security and operational </a:t>
-            </a:r>
-            <a:r>
-              <a:rPr lang="en-GB" sz="1400" dirty="0" smtClean="0"/>
-              <a:t>needs</a:t>
+              <a:rPr lang="en-GB" sz="1400" dirty="0"/>
+              <a:t>The number of Elastic IP addresses you can have in EC2 per region is </a:t>
+            </a:r>
+            <a:r>
+              <a:rPr lang="en-GB" sz="1400" b="1" dirty="0" smtClean="0"/>
+              <a:t>5</a:t>
             </a:r>
             <a:endParaRPr lang="en-GB" sz="1400" dirty="0"/>
           </a:p>
@@ -4254,7 +4326,7 @@
     </p:spTree>
     <p:extLst>
       <p:ext uri="{BB962C8B-B14F-4D97-AF65-F5344CB8AC3E}">
-        <p14:creationId xmlns:p14="http://schemas.microsoft.com/office/powerpoint/2010/main" val="2713140647"/>
+        <p14:creationId xmlns:p14="http://schemas.microsoft.com/office/powerpoint/2010/main" val="1278525109"/>
       </p:ext>
     </p:extLst>
   </p:cSld>
@@ -4305,7 +4377,7 @@
           <a:p>
             <a:r>
               <a:rPr lang="en-US" dirty="0" smtClean="0"/>
-              <a:t>Storage</a:t>
+              <a:t>CloudTrail</a:t>
             </a:r>
             <a:endParaRPr lang="en-US" dirty="0"/>
           </a:p>
@@ -4329,36 +4401,29 @@
           <a:lstStyle/>
           <a:p>
             <a:r>
-              <a:rPr lang="en-GB" sz="1400" i="1" dirty="0"/>
-              <a:t>Note</a:t>
-            </a:r>
-            <a:r>
-              <a:rPr lang="en-GB" sz="1400" dirty="0"/>
-              <a:t>: </a:t>
+              <a:rPr lang="en-GB" sz="1400" dirty="0"/>
+              <a:t>CloudTrail integration with CloudWatch Logs delivers API activity captured by CloudTrail to a </a:t>
             </a:r>
             <a:r>
               <a:rPr lang="en-GB" sz="1400" b="1" dirty="0"/>
-              <a:t>Ephemeral storage </a:t>
-            </a:r>
-            <a:r>
-              <a:rPr lang="en-GB" sz="1400" dirty="0"/>
-              <a:t>is also known as </a:t>
-            </a:r>
-            <a:r>
-              <a:rPr lang="en-GB" sz="1400" i="1" dirty="0"/>
-              <a:t>instance storage</a:t>
-            </a:r>
-            <a:r>
-              <a:rPr lang="en-GB" sz="1400" dirty="0"/>
-              <a:t>. It is temporary storage that is added to your instance, unlike EBS which is an attached volume that is permanent in nature.</a:t>
-            </a:r>
+              <a:t>CloudWatch Logs log stream </a:t>
+            </a:r>
+            <a:r>
+              <a:rPr lang="en-GB" sz="1400" dirty="0"/>
+              <a:t>in the CloudWatch Logs log group you </a:t>
+            </a:r>
+            <a:r>
+              <a:rPr lang="en-GB" sz="1400" dirty="0" smtClean="0"/>
+              <a:t>specify</a:t>
+            </a:r>
+            <a:endParaRPr lang="en-GB" sz="1400" dirty="0"/>
           </a:p>
         </p:txBody>
       </p:sp>
     </p:spTree>
     <p:extLst>
       <p:ext uri="{BB962C8B-B14F-4D97-AF65-F5344CB8AC3E}">
-        <p14:creationId xmlns:p14="http://schemas.microsoft.com/office/powerpoint/2010/main" val="1473447696"/>
+        <p14:creationId xmlns:p14="http://schemas.microsoft.com/office/powerpoint/2010/main" val="4254879350"/>
       </p:ext>
     </p:extLst>
   </p:cSld>
@@ -4409,7 +4474,7 @@
           <a:p>
             <a:r>
               <a:rPr lang="en-US" dirty="0" smtClean="0"/>
-              <a:t>CloudFront - CDN </a:t>
+              <a:t>Amazon RDS</a:t>
             </a:r>
             <a:endParaRPr lang="en-US" dirty="0"/>
           </a:p>
@@ -4433,132 +4498,98 @@
           <a:lstStyle/>
           <a:p>
             <a:r>
+              <a:rPr lang="en-GB" sz="1400" dirty="0"/>
+              <a:t>Before launching actual RDS instances, you need to configure a </a:t>
+            </a:r>
+            <a:r>
+              <a:rPr lang="en-GB" sz="1400" b="1" dirty="0"/>
+              <a:t>DB Subnet </a:t>
+            </a:r>
+            <a:r>
+              <a:rPr lang="en-GB" sz="1400" b="1" dirty="0" smtClean="0"/>
+              <a:t>Group</a:t>
+            </a:r>
+          </a:p>
+          <a:p>
+            <a:r>
+              <a:rPr lang="en-GB" sz="1400" dirty="0"/>
+              <a:t>A </a:t>
+            </a:r>
+            <a:r>
+              <a:rPr lang="en-GB" sz="1400" b="1" dirty="0"/>
+              <a:t>DB Subnet Group</a:t>
+            </a:r>
+            <a:r>
+              <a:rPr lang="en-GB" sz="1400" dirty="0"/>
+              <a:t> is a collection of subnets (typically private) that you create in a VPC and designate for your DB instances</a:t>
+            </a:r>
+            <a:r>
               <a:rPr lang="en-GB" sz="1400" dirty="0" smtClean="0"/>
-              <a:t>Two different kinds of distributions:-</a:t>
-            </a:r>
-          </a:p>
-          <a:p>
-            <a:pPr lvl="1">
-              <a:buFont typeface="Wingdings" panose="05000000000000000000" pitchFamily="2" charset="2"/>
-              <a:buChar char="Ø"/>
-            </a:pPr>
+              <a:t>. </a:t>
+            </a:r>
+            <a:r>
+              <a:rPr lang="en-GB" sz="1400" dirty="0"/>
+              <a:t>Each DB subnet group should have subnets in at least two Availability Zones in a given region. Note that SQL Server Mirroring with a SQL Server DB instance requires at least 3 subnets in distinct Availability Zones</a:t>
+            </a:r>
+            <a:r>
+              <a:rPr lang="en-GB" sz="1400" dirty="0" smtClean="0"/>
+              <a:t>.</a:t>
+            </a:r>
+          </a:p>
+          <a:p>
+            <a:r>
+              <a:rPr lang="en-GB" sz="1400" dirty="0"/>
+              <a:t>When Amazon RDS creates a DB instance in a VPC, it assigns a </a:t>
+            </a:r>
             <a:r>
               <a:rPr lang="en-GB" sz="1400" b="1" dirty="0"/>
-              <a:t>Web Distributions</a:t>
-            </a:r>
-            <a:r>
-              <a:rPr lang="en-GB" sz="1400" dirty="0"/>
-              <a:t> for HTTP/HTTPS-delivered </a:t>
+              <a:t>network interface </a:t>
+            </a:r>
+            <a:r>
+              <a:rPr lang="en-GB" sz="1400" dirty="0"/>
+              <a:t>to your DB instance by using an </a:t>
+            </a:r>
+            <a:r>
+              <a:rPr lang="en-GB" sz="1400" b="1" dirty="0"/>
+              <a:t>IP address selected </a:t>
+            </a:r>
+            <a:r>
+              <a:rPr lang="en-GB" sz="1400" dirty="0"/>
+              <a:t>from your DB Subnet Group. If the primary DB instance of a Multi-AZ deployment fails, Amazon RDS can promote the corresponding standby and subsequently create a new standby using an IP address from an assigned subnet in one of the other Availability Zones</a:t>
             </a:r>
             <a:r>
               <a:rPr lang="en-GB" sz="1400" dirty="0" smtClean="0"/>
-              <a:t>contents</a:t>
-            </a:r>
-          </a:p>
-          <a:p>
-            <a:pPr lvl="1">
-              <a:buFont typeface="Wingdings" panose="05000000000000000000" pitchFamily="2" charset="2"/>
-              <a:buChar char="Ø"/>
-            </a:pPr>
-            <a:r>
-              <a:rPr lang="en-GB" sz="1400" b="1" dirty="0" smtClean="0"/>
-              <a:t>RTMP </a:t>
+              <a:t>.</a:t>
+            </a:r>
+          </a:p>
+          <a:p>
+            <a:r>
+              <a:rPr lang="en-GB" sz="1400" dirty="0"/>
+              <a:t>The rules of a </a:t>
             </a:r>
             <a:r>
               <a:rPr lang="en-GB" sz="1400" b="1" dirty="0"/>
-              <a:t>Distributions</a:t>
-            </a:r>
-            <a:r>
-              <a:rPr lang="en-GB" sz="1400" dirty="0"/>
-              <a:t> for delivering streaming media content to end users in real </a:t>
-            </a:r>
-            <a:r>
-              <a:rPr lang="en-GB" sz="1400" dirty="0" smtClean="0"/>
-              <a:t>time</a:t>
-            </a:r>
-          </a:p>
-          <a:p>
-            <a:pPr lvl="1">
-              <a:buFont typeface="Wingdings" panose="05000000000000000000" pitchFamily="2" charset="2"/>
-              <a:buChar char="Ø"/>
-            </a:pPr>
-            <a:endParaRPr lang="en-GB" sz="1400" dirty="0"/>
-          </a:p>
-          <a:p>
-            <a:r>
-              <a:rPr lang="en-GB" sz="1400" dirty="0"/>
-              <a:t>Each distribution has a unique </a:t>
-            </a:r>
-            <a:r>
-              <a:rPr lang="en-GB" sz="1400" i="1" dirty="0"/>
-              <a:t>cloudfront.net</a:t>
-            </a:r>
-            <a:r>
-              <a:rPr lang="en-GB" sz="1400" dirty="0"/>
-              <a:t> domain name (e.g. cdn123.cloudfront.net) that can be used to reference objects through the global network of edge locations. </a:t>
-            </a:r>
-            <a:endParaRPr lang="en-GB" sz="1400" dirty="0" smtClean="0"/>
-          </a:p>
-          <a:p>
-            <a:endParaRPr lang="en-GB" sz="1400" dirty="0"/>
-          </a:p>
-          <a:p>
-            <a:r>
-              <a:rPr lang="en-GB" sz="1400" dirty="0"/>
-              <a:t>To use Amazon CloudFront</a:t>
-            </a:r>
-            <a:r>
-              <a:rPr lang="en-GB" sz="1400" dirty="0" smtClean="0"/>
-              <a:t>:-</a:t>
-            </a:r>
-            <a:endParaRPr lang="en-GB" sz="1400" dirty="0"/>
-          </a:p>
-          <a:p>
-            <a:r>
-              <a:rPr lang="en-GB" sz="1400" dirty="0"/>
-              <a:t>Store the original versions of your files on one or more origin servers. An </a:t>
+              <a:t>Security Group</a:t>
+            </a:r>
+            <a:r>
+              <a:rPr lang="en-GB" sz="1400" dirty="0"/>
+              <a:t> control the inbound traffic that's allowed to reach the instances that are associated with the security group and the outbound traffic that's allowed to leave them. By </a:t>
             </a:r>
             <a:r>
               <a:rPr lang="en-GB" sz="1400" b="1" dirty="0"/>
-              <a:t>origin server</a:t>
-            </a:r>
-            <a:r>
-              <a:rPr lang="en-GB" sz="1400" dirty="0"/>
-              <a:t> is the location of the definitive version of an object. Origin servers could be </a:t>
-            </a:r>
-            <a:r>
-              <a:rPr lang="en-GB" sz="1400" b="1" dirty="0"/>
-              <a:t>an Amazon S3 bucket, an Amazon EC2 instance, an Elastic Load Balancer or another remote server</a:t>
-            </a:r>
-            <a:r>
-              <a:rPr lang="en-GB" sz="1400" dirty="0"/>
-              <a:t>.</a:t>
-            </a:r>
-          </a:p>
-          <a:p>
-            <a:r>
-              <a:rPr lang="en-GB" sz="1400" dirty="0"/>
-              <a:t>Create a distribution to register the origin servers with Amazon CloudFront.</a:t>
-            </a:r>
-          </a:p>
-          <a:p>
-            <a:r>
-              <a:rPr lang="en-GB" sz="1400" dirty="0"/>
-              <a:t>Use your distribution’s domain name in your web pages, media player, or application. When end users request an object using this domain name, they are automatically routed to the nearest edge location for high-performance delivery of your content.</a:t>
-            </a:r>
-          </a:p>
-          <a:p>
-            <a:endParaRPr lang="en-GB" sz="1400" dirty="0"/>
-          </a:p>
-          <a:p>
-            <a:endParaRPr lang="en-GB" sz="1400" dirty="0"/>
+              <a:t>default</a:t>
+            </a:r>
+            <a:r>
+              <a:rPr lang="en-GB" sz="1400" dirty="0"/>
+              <a:t>, security groups allow all outbound traffic and deny all inbound traffic.</a:t>
+            </a:r>
           </a:p>
         </p:txBody>
       </p:sp>
     </p:spTree>
     <p:extLst>
       <p:ext uri="{BB962C8B-B14F-4D97-AF65-F5344CB8AC3E}">
-        <p14:creationId xmlns:p14="http://schemas.microsoft.com/office/powerpoint/2010/main" val="2127971700"/>
+        <p14:creationId xmlns:p14="http://schemas.microsoft.com/office/powerpoint/2010/main" val="1745718939"/>
       </p:ext>
     </p:extLst>
   </p:cSld>
@@ -4609,6 +4640,468 @@
           <a:p>
             <a:r>
               <a:rPr lang="en-US" dirty="0" smtClean="0"/>
+              <a:t>Subnet</a:t>
+            </a:r>
+            <a:endParaRPr lang="en-US" dirty="0"/>
+          </a:p>
+        </p:txBody>
+      </p:sp>
+      <p:sp>
+        <p:nvSpPr>
+          <p:cNvPr id="3" name="Content Placeholder 2"/>
+          <p:cNvSpPr>
+            <a:spLocks noGrp="1"/>
+          </p:cNvSpPr>
+          <p:nvPr>
+            <p:ph idx="1"/>
+          </p:nvPr>
+        </p:nvSpPr>
+        <p:spPr/>
+        <p:txBody>
+          <a:bodyPr>
+            <a:normAutofit/>
+          </a:bodyPr>
+          <a:lstStyle/>
+          <a:p>
+            <a:r>
+              <a:rPr lang="en-GB" sz="1400" b="1" dirty="0"/>
+              <a:t>Subnets</a:t>
+            </a:r>
+            <a:r>
+              <a:rPr lang="en-GB" sz="1400" dirty="0"/>
+              <a:t> are segments of a VPC's IP address range that allow you </a:t>
+            </a:r>
+            <a:r>
+              <a:rPr lang="en-GB" sz="1400" b="1" dirty="0"/>
+              <a:t>to group your resources </a:t>
+            </a:r>
+            <a:r>
+              <a:rPr lang="en-GB" sz="1400" dirty="0"/>
+              <a:t>based on security and operational </a:t>
+            </a:r>
+            <a:r>
+              <a:rPr lang="en-GB" sz="1400" dirty="0" smtClean="0"/>
+              <a:t>needs</a:t>
+            </a:r>
+            <a:endParaRPr lang="en-GB" sz="1400" dirty="0"/>
+          </a:p>
+        </p:txBody>
+      </p:sp>
+    </p:spTree>
+    <p:extLst>
+      <p:ext uri="{BB962C8B-B14F-4D97-AF65-F5344CB8AC3E}">
+        <p14:creationId xmlns:p14="http://schemas.microsoft.com/office/powerpoint/2010/main" val="2713140647"/>
+      </p:ext>
+    </p:extLst>
+  </p:cSld>
+  <p:clrMapOvr>
+    <a:masterClrMapping/>
+  </p:clrMapOvr>
+  <p:timing>
+    <p:tnLst>
+      <p:par>
+        <p:cTn id="1" dur="indefinite" restart="never" nodeType="tmRoot"/>
+      </p:par>
+    </p:tnLst>
+  </p:timing>
+</p:sld>
+</file>
+
+<file path=ppt/slides/slide16.xml><?xml version="1.0" encoding="utf-8"?>
+<p:sld xmlns:a="http://schemas.openxmlformats.org/drawingml/2006/main" xmlns:r="http://schemas.openxmlformats.org/officeDocument/2006/relationships" xmlns:p="http://schemas.openxmlformats.org/presentationml/2006/main">
+  <p:cSld>
+    <p:spTree>
+      <p:nvGrpSpPr>
+        <p:cNvPr id="1" name=""/>
+        <p:cNvGrpSpPr/>
+        <p:nvPr/>
+      </p:nvGrpSpPr>
+      <p:grpSpPr>
+        <a:xfrm>
+          <a:off x="0" y="0"/>
+          <a:ext cx="0" cy="0"/>
+          <a:chOff x="0" y="0"/>
+          <a:chExt cx="0" cy="0"/>
+        </a:xfrm>
+      </p:grpSpPr>
+      <p:sp>
+        <p:nvSpPr>
+          <p:cNvPr id="2" name="Title 1"/>
+          <p:cNvSpPr>
+            <a:spLocks noGrp="1"/>
+          </p:cNvSpPr>
+          <p:nvPr>
+            <p:ph type="title"/>
+          </p:nvPr>
+        </p:nvSpPr>
+        <p:spPr/>
+        <p:txBody>
+          <a:bodyPr/>
+          <a:lstStyle/>
+          <a:p>
+            <a:r>
+              <a:rPr lang="en-US" dirty="0" smtClean="0"/>
+              <a:t>Storage</a:t>
+            </a:r>
+            <a:endParaRPr lang="en-US" dirty="0"/>
+          </a:p>
+        </p:txBody>
+      </p:sp>
+      <p:sp>
+        <p:nvSpPr>
+          <p:cNvPr id="3" name="Content Placeholder 2"/>
+          <p:cNvSpPr>
+            <a:spLocks noGrp="1"/>
+          </p:cNvSpPr>
+          <p:nvPr>
+            <p:ph idx="1"/>
+          </p:nvPr>
+        </p:nvSpPr>
+        <p:spPr/>
+        <p:txBody>
+          <a:bodyPr>
+            <a:normAutofit/>
+          </a:bodyPr>
+          <a:lstStyle/>
+          <a:p>
+            <a:r>
+              <a:rPr lang="en-GB" sz="1400" i="1" dirty="0"/>
+              <a:t>Note</a:t>
+            </a:r>
+            <a:r>
+              <a:rPr lang="en-GB" sz="1400" dirty="0"/>
+              <a:t>: </a:t>
+            </a:r>
+            <a:r>
+              <a:rPr lang="en-GB" sz="1400" b="1" dirty="0"/>
+              <a:t>Ephemeral storage </a:t>
+            </a:r>
+            <a:r>
+              <a:rPr lang="en-GB" sz="1400" dirty="0"/>
+              <a:t>is also known as </a:t>
+            </a:r>
+            <a:r>
+              <a:rPr lang="en-GB" sz="1400" i="1" dirty="0"/>
+              <a:t>instance storage</a:t>
+            </a:r>
+            <a:r>
+              <a:rPr lang="en-GB" sz="1400" dirty="0"/>
+              <a:t>. It is temporary storage that is added to your instance, unlike EBS which is an attached volume that is permanent in nature</a:t>
+            </a:r>
+            <a:r>
+              <a:rPr lang="en-GB" sz="1400" dirty="0" smtClean="0"/>
+              <a:t>.</a:t>
+            </a:r>
+          </a:p>
+          <a:p>
+            <a:r>
+              <a:rPr lang="en-GB" sz="1400" dirty="0" smtClean="0"/>
+              <a:t>General purpose and Provisioned IOPS - Both </a:t>
+            </a:r>
+            <a:r>
+              <a:rPr lang="en-GB" sz="1400" dirty="0"/>
+              <a:t>are SSD based and suitable </a:t>
+            </a:r>
+            <a:r>
+              <a:rPr lang="en-GB" sz="1400" b="1" dirty="0">
+                <a:solidFill>
+                  <a:srgbClr val="00B050"/>
+                </a:solidFill>
+              </a:rPr>
+              <a:t>for random I/O </a:t>
+            </a:r>
+            <a:r>
+              <a:rPr lang="en-GB" sz="1400" b="1" dirty="0" smtClean="0">
+                <a:solidFill>
+                  <a:srgbClr val="00B050"/>
+                </a:solidFill>
+              </a:rPr>
+              <a:t>workloads</a:t>
+            </a:r>
+          </a:p>
+          <a:p>
+            <a:r>
+              <a:rPr lang="en-GB" sz="1400" b="1" dirty="0">
+                <a:solidFill>
+                  <a:srgbClr val="00B050"/>
+                </a:solidFill>
+              </a:rPr>
+              <a:t>Snowball</a:t>
+            </a:r>
+            <a:r>
+              <a:rPr lang="en-GB" sz="1400" dirty="0">
+                <a:solidFill>
+                  <a:srgbClr val="00B050"/>
+                </a:solidFill>
+              </a:rPr>
+              <a:t> </a:t>
+            </a:r>
+            <a:r>
+              <a:rPr lang="en-GB" sz="1400" dirty="0"/>
+              <a:t>offers convenient way to transfer large amount of data by physically shipping the data using secure snowball appliance</a:t>
+            </a:r>
+            <a:endParaRPr lang="en-GB" sz="1400" b="1" dirty="0">
+              <a:solidFill>
+                <a:srgbClr val="00B050"/>
+              </a:solidFill>
+            </a:endParaRPr>
+          </a:p>
+        </p:txBody>
+      </p:sp>
+    </p:spTree>
+    <p:extLst>
+      <p:ext uri="{BB962C8B-B14F-4D97-AF65-F5344CB8AC3E}">
+        <p14:creationId xmlns:p14="http://schemas.microsoft.com/office/powerpoint/2010/main" val="1473447696"/>
+      </p:ext>
+    </p:extLst>
+  </p:cSld>
+  <p:clrMapOvr>
+    <a:masterClrMapping/>
+  </p:clrMapOvr>
+  <p:timing>
+    <p:tnLst>
+      <p:par>
+        <p:cTn id="1" dur="indefinite" restart="never" nodeType="tmRoot"/>
+      </p:par>
+    </p:tnLst>
+  </p:timing>
+</p:sld>
+</file>
+
+<file path=ppt/slides/slide17.xml><?xml version="1.0" encoding="utf-8"?>
+<p:sld xmlns:a="http://schemas.openxmlformats.org/drawingml/2006/main" xmlns:r="http://schemas.openxmlformats.org/officeDocument/2006/relationships" xmlns:p="http://schemas.openxmlformats.org/presentationml/2006/main">
+  <p:cSld>
+    <p:spTree>
+      <p:nvGrpSpPr>
+        <p:cNvPr id="1" name=""/>
+        <p:cNvGrpSpPr/>
+        <p:nvPr/>
+      </p:nvGrpSpPr>
+      <p:grpSpPr>
+        <a:xfrm>
+          <a:off x="0" y="0"/>
+          <a:ext cx="0" cy="0"/>
+          <a:chOff x="0" y="0"/>
+          <a:chExt cx="0" cy="0"/>
+        </a:xfrm>
+      </p:grpSpPr>
+      <p:sp>
+        <p:nvSpPr>
+          <p:cNvPr id="2" name="Title 1"/>
+          <p:cNvSpPr>
+            <a:spLocks noGrp="1"/>
+          </p:cNvSpPr>
+          <p:nvPr>
+            <p:ph type="title"/>
+          </p:nvPr>
+        </p:nvSpPr>
+        <p:spPr/>
+        <p:txBody>
+          <a:bodyPr/>
+          <a:lstStyle/>
+          <a:p>
+            <a:r>
+              <a:rPr lang="en-US" dirty="0" smtClean="0"/>
+              <a:t>CloudFront - CDN </a:t>
+            </a:r>
+            <a:endParaRPr lang="en-US" dirty="0"/>
+          </a:p>
+        </p:txBody>
+      </p:sp>
+      <p:sp>
+        <p:nvSpPr>
+          <p:cNvPr id="3" name="Content Placeholder 2"/>
+          <p:cNvSpPr>
+            <a:spLocks noGrp="1"/>
+          </p:cNvSpPr>
+          <p:nvPr>
+            <p:ph idx="1"/>
+          </p:nvPr>
+        </p:nvSpPr>
+        <p:spPr/>
+        <p:txBody>
+          <a:bodyPr>
+            <a:normAutofit/>
+          </a:bodyPr>
+          <a:lstStyle/>
+          <a:p>
+            <a:r>
+              <a:rPr lang="en-GB" sz="1400" dirty="0" smtClean="0"/>
+              <a:t>Two different kinds of distributions:-</a:t>
+            </a:r>
+          </a:p>
+          <a:p>
+            <a:pPr lvl="1">
+              <a:buFont typeface="Wingdings" panose="05000000000000000000" pitchFamily="2" charset="2"/>
+              <a:buChar char="Ø"/>
+            </a:pPr>
+            <a:r>
+              <a:rPr lang="en-GB" sz="1400" b="1" dirty="0"/>
+              <a:t>Web Distributions</a:t>
+            </a:r>
+            <a:r>
+              <a:rPr lang="en-GB" sz="1400" dirty="0"/>
+              <a:t> for HTTP/HTTPS-delivered </a:t>
+            </a:r>
+            <a:r>
+              <a:rPr lang="en-GB" sz="1400" dirty="0" smtClean="0"/>
+              <a:t>contents</a:t>
+            </a:r>
+          </a:p>
+          <a:p>
+            <a:pPr lvl="1">
+              <a:buFont typeface="Wingdings" panose="05000000000000000000" pitchFamily="2" charset="2"/>
+              <a:buChar char="Ø"/>
+            </a:pPr>
+            <a:r>
+              <a:rPr lang="en-GB" sz="1400" b="1" dirty="0" smtClean="0"/>
+              <a:t>RTMP </a:t>
+            </a:r>
+            <a:r>
+              <a:rPr lang="en-GB" sz="1400" b="1" dirty="0"/>
+              <a:t>Distributions</a:t>
+            </a:r>
+            <a:r>
+              <a:rPr lang="en-GB" sz="1400" dirty="0"/>
+              <a:t> for delivering streaming media content to end users in real </a:t>
+            </a:r>
+            <a:r>
+              <a:rPr lang="en-GB" sz="1400" dirty="0" smtClean="0"/>
+              <a:t>time</a:t>
+            </a:r>
+          </a:p>
+          <a:p>
+            <a:pPr lvl="1">
+              <a:buFont typeface="Wingdings" panose="05000000000000000000" pitchFamily="2" charset="2"/>
+              <a:buChar char="Ø"/>
+            </a:pPr>
+            <a:endParaRPr lang="en-GB" sz="1400" dirty="0"/>
+          </a:p>
+          <a:p>
+            <a:r>
+              <a:rPr lang="en-GB" sz="1400" dirty="0"/>
+              <a:t>Each distribution has a unique </a:t>
+            </a:r>
+            <a:r>
+              <a:rPr lang="en-GB" sz="1400" i="1" dirty="0"/>
+              <a:t>cloudfront.net</a:t>
+            </a:r>
+            <a:r>
+              <a:rPr lang="en-GB" sz="1400" dirty="0"/>
+              <a:t> domain name (e.g. cdn123.cloudfront.net) that can be used to reference objects through the global network of edge locations. </a:t>
+            </a:r>
+            <a:endParaRPr lang="en-GB" sz="1400" dirty="0" smtClean="0"/>
+          </a:p>
+          <a:p>
+            <a:endParaRPr lang="en-GB" sz="1400" dirty="0"/>
+          </a:p>
+          <a:p>
+            <a:r>
+              <a:rPr lang="en-GB" sz="1400" dirty="0"/>
+              <a:t>To use Amazon CloudFront</a:t>
+            </a:r>
+            <a:r>
+              <a:rPr lang="en-GB" sz="1400" dirty="0" smtClean="0"/>
+              <a:t>:-</a:t>
+            </a:r>
+            <a:endParaRPr lang="en-GB" sz="1400" dirty="0"/>
+          </a:p>
+          <a:p>
+            <a:r>
+              <a:rPr lang="en-GB" sz="1400" dirty="0"/>
+              <a:t>Store the original versions of your files on one or more origin servers. An </a:t>
+            </a:r>
+            <a:r>
+              <a:rPr lang="en-GB" sz="1400" b="1" dirty="0"/>
+              <a:t>origin server</a:t>
+            </a:r>
+            <a:r>
+              <a:rPr lang="en-GB" sz="1400" dirty="0"/>
+              <a:t> is the location of the definitive version of an object. Origin servers could be </a:t>
+            </a:r>
+            <a:r>
+              <a:rPr lang="en-GB" sz="1400" b="1" dirty="0"/>
+              <a:t>an Amazon S3 bucket, an Amazon EC2 instance, an Elastic Load Balancer or another remote server</a:t>
+            </a:r>
+            <a:r>
+              <a:rPr lang="en-GB" sz="1400" dirty="0"/>
+              <a:t>.</a:t>
+            </a:r>
+          </a:p>
+          <a:p>
+            <a:r>
+              <a:rPr lang="en-GB" sz="1400" dirty="0"/>
+              <a:t>Create a distribution to register the origin servers with Amazon CloudFront.</a:t>
+            </a:r>
+          </a:p>
+          <a:p>
+            <a:r>
+              <a:rPr lang="en-GB" sz="1400" dirty="0"/>
+              <a:t>Use your distribution’s domain name in your web pages, media player, or application. When end users request an object using this domain name, they are automatically routed to the nearest edge location for high-performance delivery of your content.</a:t>
+            </a:r>
+          </a:p>
+          <a:p>
+            <a:endParaRPr lang="en-GB" sz="1400" dirty="0"/>
+          </a:p>
+          <a:p>
+            <a:endParaRPr lang="en-GB" sz="1400" dirty="0"/>
+          </a:p>
+        </p:txBody>
+      </p:sp>
+    </p:spTree>
+    <p:extLst>
+      <p:ext uri="{BB962C8B-B14F-4D97-AF65-F5344CB8AC3E}">
+        <p14:creationId xmlns:p14="http://schemas.microsoft.com/office/powerpoint/2010/main" val="2127971700"/>
+      </p:ext>
+    </p:extLst>
+  </p:cSld>
+  <p:clrMapOvr>
+    <a:masterClrMapping/>
+  </p:clrMapOvr>
+  <p:timing>
+    <p:tnLst>
+      <p:par>
+        <p:cTn id="1" dur="indefinite" restart="never" nodeType="tmRoot"/>
+      </p:par>
+    </p:tnLst>
+  </p:timing>
+</p:sld>
+</file>
+
+<file path=ppt/slides/slide18.xml><?xml version="1.0" encoding="utf-8"?>
+<p:sld xmlns:a="http://schemas.openxmlformats.org/drawingml/2006/main" xmlns:r="http://schemas.openxmlformats.org/officeDocument/2006/relationships" xmlns:p="http://schemas.openxmlformats.org/presentationml/2006/main">
+  <p:cSld>
+    <p:spTree>
+      <p:nvGrpSpPr>
+        <p:cNvPr id="1" name=""/>
+        <p:cNvGrpSpPr/>
+        <p:nvPr/>
+      </p:nvGrpSpPr>
+      <p:grpSpPr>
+        <a:xfrm>
+          <a:off x="0" y="0"/>
+          <a:ext cx="0" cy="0"/>
+          <a:chOff x="0" y="0"/>
+          <a:chExt cx="0" cy="0"/>
+        </a:xfrm>
+      </p:grpSpPr>
+      <p:sp>
+        <p:nvSpPr>
+          <p:cNvPr id="2" name="Title 1"/>
+          <p:cNvSpPr>
+            <a:spLocks noGrp="1"/>
+          </p:cNvSpPr>
+          <p:nvPr>
+            <p:ph type="title"/>
+          </p:nvPr>
+        </p:nvSpPr>
+        <p:spPr/>
+        <p:txBody>
+          <a:bodyPr/>
+          <a:lstStyle/>
+          <a:p>
+            <a:r>
+              <a:rPr lang="en-US" dirty="0" smtClean="0"/>
               <a:t>CloudFront - Distribution</a:t>
             </a:r>
             <a:endParaRPr lang="en-US" dirty="0"/>
@@ -4791,7 +5284,7 @@
 </p:sld>
 </file>
 
-<file path=ppt/slides/slide16.xml><?xml version="1.0" encoding="utf-8"?>
+<file path=ppt/slides/slide19.xml><?xml version="1.0" encoding="utf-8"?>
 <p:sld xmlns:a="http://schemas.openxmlformats.org/drawingml/2006/main" xmlns:r="http://schemas.openxmlformats.org/officeDocument/2006/relationships" xmlns:p="http://schemas.openxmlformats.org/presentationml/2006/main">
   <p:cSld>
     <p:spTree>
@@ -4966,90 +5459,6 @@
 </p:sld>
 </file>
 
-<file path=ppt/slides/slide17.xml><?xml version="1.0" encoding="utf-8"?>
-<p:sld xmlns:a="http://schemas.openxmlformats.org/drawingml/2006/main" xmlns:r="http://schemas.openxmlformats.org/officeDocument/2006/relationships" xmlns:p="http://schemas.openxmlformats.org/presentationml/2006/main">
-  <p:cSld>
-    <p:spTree>
-      <p:nvGrpSpPr>
-        <p:cNvPr id="1" name=""/>
-        <p:cNvGrpSpPr/>
-        <p:nvPr/>
-      </p:nvGrpSpPr>
-      <p:grpSpPr>
-        <a:xfrm>
-          <a:off x="0" y="0"/>
-          <a:ext cx="0" cy="0"/>
-          <a:chOff x="0" y="0"/>
-          <a:chExt cx="0" cy="0"/>
-        </a:xfrm>
-      </p:grpSpPr>
-      <p:sp>
-        <p:nvSpPr>
-          <p:cNvPr id="2" name="Title 1"/>
-          <p:cNvSpPr>
-            <a:spLocks noGrp="1"/>
-          </p:cNvSpPr>
-          <p:nvPr>
-            <p:ph type="title"/>
-          </p:nvPr>
-        </p:nvSpPr>
-        <p:spPr/>
-        <p:txBody>
-          <a:bodyPr/>
-          <a:lstStyle/>
-          <a:p>
-            <a:r>
-              <a:rPr lang="en-US" dirty="0" smtClean="0"/>
-              <a:t>References</a:t>
-            </a:r>
-            <a:endParaRPr lang="en-US" dirty="0"/>
-          </a:p>
-        </p:txBody>
-      </p:sp>
-      <p:sp>
-        <p:nvSpPr>
-          <p:cNvPr id="3" name="Content Placeholder 2"/>
-          <p:cNvSpPr>
-            <a:spLocks noGrp="1"/>
-          </p:cNvSpPr>
-          <p:nvPr>
-            <p:ph idx="1"/>
-          </p:nvPr>
-        </p:nvSpPr>
-        <p:spPr/>
-        <p:txBody>
-          <a:bodyPr>
-            <a:normAutofit/>
-          </a:bodyPr>
-          <a:lstStyle/>
-          <a:p>
-            <a:pPr marL="0" indent="0">
-              <a:buNone/>
-            </a:pPr>
-            <a:endParaRPr lang="en-US" sz="1600" dirty="0" smtClean="0"/>
-          </a:p>
-        </p:txBody>
-      </p:sp>
-    </p:spTree>
-    <p:extLst>
-      <p:ext uri="{BB962C8B-B14F-4D97-AF65-F5344CB8AC3E}">
-        <p14:creationId xmlns:p14="http://schemas.microsoft.com/office/powerpoint/2010/main" val="924403351"/>
-      </p:ext>
-    </p:extLst>
-  </p:cSld>
-  <p:clrMapOvr>
-    <a:masterClrMapping/>
-  </p:clrMapOvr>
-  <p:timing>
-    <p:tnLst>
-      <p:par>
-        <p:cTn id="1" dur="indefinite" restart="never" nodeType="tmRoot"/>
-      </p:par>
-    </p:tnLst>
-  </p:timing>
-</p:sld>
-</file>
-
 <file path=ppt/slides/slide2.xml><?xml version="1.0" encoding="utf-8"?>
 <p:sld xmlns:a="http://schemas.openxmlformats.org/drawingml/2006/main" xmlns:r="http://schemas.openxmlformats.org/officeDocument/2006/relationships" xmlns:p="http://schemas.openxmlformats.org/presentationml/2006/main">
   <p:cSld>
@@ -5131,8 +5540,130 @@
             </a:r>
             <a:r>
               <a:rPr lang="en-GB" sz="1400" dirty="0"/>
-              <a:t>. The limit for Internet gateways per region is directly correlated to this one. Increasing this limit will increase the limit on Internet gateways per region by the same amount.</a:t>
-            </a:r>
+              <a:t>. The limit for Internet gateways per region is directly correlated to this one. Increasing this limit will increase the limit on Internet gateways per region by the same amount</a:t>
+            </a:r>
+            <a:r>
+              <a:rPr lang="en-GB" sz="1400" dirty="0" smtClean="0"/>
+              <a:t>.</a:t>
+            </a:r>
+          </a:p>
+          <a:p>
+            <a:r>
+              <a:rPr lang="en-GB" sz="1400" dirty="0"/>
+              <a:t>Amazon creates the requested VPC and the following linked services:</a:t>
+            </a:r>
+          </a:p>
+          <a:p>
+            <a:r>
+              <a:rPr lang="en-GB" sz="1400" dirty="0"/>
+              <a:t>a </a:t>
+            </a:r>
+            <a:r>
+              <a:rPr lang="en-GB" sz="1400" b="1" dirty="0"/>
+              <a:t>DHCP options set </a:t>
+            </a:r>
+            <a:r>
+              <a:rPr lang="en-GB" sz="1400" dirty="0"/>
+              <a:t> (this set enables DNS for instances that need to communicate over the VPC's Internet gateway) </a:t>
+            </a:r>
+          </a:p>
+          <a:p>
+            <a:r>
+              <a:rPr lang="en-GB" sz="1400" dirty="0"/>
+              <a:t>a </a:t>
+            </a:r>
+            <a:r>
+              <a:rPr lang="en-GB" sz="1400" b="1" dirty="0"/>
+              <a:t>Route Table  </a:t>
+            </a:r>
+            <a:r>
+              <a:rPr lang="en-GB" sz="1400" dirty="0"/>
+              <a:t>(it contains a set of rules, called </a:t>
+            </a:r>
+            <a:r>
+              <a:rPr lang="en-GB" sz="1400" i="1" dirty="0"/>
+              <a:t>routes</a:t>
+            </a:r>
+            <a:r>
+              <a:rPr lang="en-GB" sz="1400" dirty="0"/>
+              <a:t>, that are used to determine where network traffic is directed) </a:t>
+            </a:r>
+          </a:p>
+          <a:p>
+            <a:r>
+              <a:rPr lang="en-GB" sz="1400" dirty="0"/>
+              <a:t>a </a:t>
+            </a:r>
+            <a:r>
+              <a:rPr lang="en-GB" sz="1400" b="1" dirty="0"/>
+              <a:t>Network ACL  </a:t>
+            </a:r>
+            <a:r>
+              <a:rPr lang="en-GB" sz="1400" dirty="0"/>
+              <a:t>(it is a list of rules to determine whether traffic is allowed in or out of any subnet associated with the network ACL</a:t>
+            </a:r>
+            <a:r>
+              <a:rPr lang="en-GB" sz="1400" dirty="0" smtClean="0"/>
+              <a:t>)</a:t>
+            </a:r>
+          </a:p>
+          <a:p>
+            <a:r>
+              <a:rPr lang="en-GB" sz="1400" dirty="0"/>
+              <a:t>A route table contains a set of rules, called routes, that are used to determine where network traffic is directed. Each route in a table specifies a destination CIDR and a </a:t>
+            </a:r>
+            <a:r>
+              <a:rPr lang="en-GB" sz="1400" dirty="0" smtClean="0"/>
+              <a:t>target. </a:t>
+            </a:r>
+            <a:r>
+              <a:rPr lang="en-GB" sz="1400" dirty="0"/>
+              <a:t>If a subnet have a route with the destination (0.0.0.0/0) and target the Internet Gateway, the subnet is known as a </a:t>
+            </a:r>
+            <a:r>
+              <a:rPr lang="en-GB" sz="1400" b="1" dirty="0"/>
+              <a:t>public subnet</a:t>
+            </a:r>
+            <a:r>
+              <a:rPr lang="en-GB" sz="1400" b="1" dirty="0" smtClean="0"/>
+              <a:t>. </a:t>
+            </a:r>
+            <a:r>
+              <a:rPr lang="en-GB" sz="1400" dirty="0"/>
+              <a:t>If a subnet doesn't have a route to the Internet (0.0.0.0/0) through a gateway, the subnet is known as a </a:t>
+            </a:r>
+            <a:r>
+              <a:rPr lang="en-GB" sz="1400" b="1" dirty="0"/>
+              <a:t>private subnet.</a:t>
+            </a:r>
+            <a:endParaRPr lang="en-GB" sz="1400" b="1" dirty="0" smtClean="0"/>
+          </a:p>
+          <a:p>
+            <a:r>
+              <a:rPr lang="en-GB" sz="1400" dirty="0" smtClean="0"/>
+              <a:t>If </a:t>
+            </a:r>
+            <a:r>
+              <a:rPr lang="en-GB" sz="1400" dirty="0"/>
+              <a:t>you don't explicitly associate a subnet with a network ACL, the subnet is automatically associated with the default network ACL that allows all inbound and outbound traffic</a:t>
+            </a:r>
+            <a:r>
+              <a:rPr lang="en-GB" sz="1400" dirty="0" smtClean="0"/>
+              <a:t>.</a:t>
+            </a:r>
+          </a:p>
+          <a:p>
+            <a:r>
+              <a:rPr lang="en-GB" sz="1400" dirty="0" smtClean="0"/>
+              <a:t>It's </a:t>
+            </a:r>
+            <a:r>
+              <a:rPr lang="en-GB" sz="1400" dirty="0"/>
+              <a:t>important to disable the Source destination Check on NAT Instance</a:t>
+            </a:r>
+          </a:p>
+          <a:p>
+            <a:endParaRPr lang="en-GB" sz="1400" dirty="0"/>
           </a:p>
         </p:txBody>
       </p:sp>
@@ -5140,6 +5671,1268 @@
     <p:extLst>
       <p:ext uri="{BB962C8B-B14F-4D97-AF65-F5344CB8AC3E}">
         <p14:creationId xmlns:p14="http://schemas.microsoft.com/office/powerpoint/2010/main" val="3578744401"/>
+      </p:ext>
+    </p:extLst>
+  </p:cSld>
+  <p:clrMapOvr>
+    <a:masterClrMapping/>
+  </p:clrMapOvr>
+  <p:timing>
+    <p:tnLst>
+      <p:par>
+        <p:cTn id="1" dur="indefinite" restart="never" nodeType="tmRoot"/>
+      </p:par>
+    </p:tnLst>
+  </p:timing>
+</p:sld>
+</file>
+
+<file path=ppt/slides/slide20.xml><?xml version="1.0" encoding="utf-8"?>
+<p:sld xmlns:a="http://schemas.openxmlformats.org/drawingml/2006/main" xmlns:r="http://schemas.openxmlformats.org/officeDocument/2006/relationships" xmlns:p="http://schemas.openxmlformats.org/presentationml/2006/main">
+  <p:cSld>
+    <p:spTree>
+      <p:nvGrpSpPr>
+        <p:cNvPr id="1" name=""/>
+        <p:cNvGrpSpPr/>
+        <p:nvPr/>
+      </p:nvGrpSpPr>
+      <p:grpSpPr>
+        <a:xfrm>
+          <a:off x="0" y="0"/>
+          <a:ext cx="0" cy="0"/>
+          <a:chOff x="0" y="0"/>
+          <a:chExt cx="0" cy="0"/>
+        </a:xfrm>
+      </p:grpSpPr>
+      <p:sp>
+        <p:nvSpPr>
+          <p:cNvPr id="2" name="Title 1"/>
+          <p:cNvSpPr>
+            <a:spLocks noGrp="1"/>
+          </p:cNvSpPr>
+          <p:nvPr>
+            <p:ph type="title"/>
+          </p:nvPr>
+        </p:nvSpPr>
+        <p:spPr/>
+        <p:txBody>
+          <a:bodyPr/>
+          <a:lstStyle/>
+          <a:p>
+            <a:r>
+              <a:rPr lang="en-US" dirty="0" smtClean="0"/>
+              <a:t>CloudFormation</a:t>
+            </a:r>
+            <a:endParaRPr lang="en-US" dirty="0"/>
+          </a:p>
+        </p:txBody>
+      </p:sp>
+      <p:sp>
+        <p:nvSpPr>
+          <p:cNvPr id="3" name="Content Placeholder 2"/>
+          <p:cNvSpPr>
+            <a:spLocks noGrp="1"/>
+          </p:cNvSpPr>
+          <p:nvPr>
+            <p:ph idx="1"/>
+          </p:nvPr>
+        </p:nvSpPr>
+        <p:spPr/>
+        <p:txBody>
+          <a:bodyPr>
+            <a:normAutofit/>
+          </a:bodyPr>
+          <a:lstStyle/>
+          <a:p>
+            <a:r>
+              <a:rPr lang="en-GB" sz="1400" dirty="0" smtClean="0"/>
+              <a:t>CloudFormation </a:t>
+            </a:r>
+            <a:r>
+              <a:rPr lang="en-GB" sz="1400" dirty="0"/>
+              <a:t>automatically handles dependencies between the resources in the stack. The EC2 instance can't be created without a security group, so CloudFormation waits for the security group to finish before moving on. </a:t>
+            </a:r>
+            <a:endParaRPr lang="en-GB" sz="1400" dirty="0" smtClean="0"/>
+          </a:p>
+          <a:p>
+            <a:r>
+              <a:rPr lang="en-GB" sz="1400" dirty="0"/>
+              <a:t>CloudFormation is easy to integrate into other workflows because all it does is orchestrate other AWS products and make it easy to repeat patterns. </a:t>
+            </a:r>
+            <a:endParaRPr lang="en-GB" sz="1400" dirty="0" smtClean="0"/>
+          </a:p>
+          <a:p>
+            <a:r>
+              <a:rPr lang="en-GB" sz="1400" dirty="0"/>
+              <a:t>N</a:t>
+            </a:r>
+            <a:r>
+              <a:rPr lang="en-GB" sz="1400" dirty="0" smtClean="0"/>
+              <a:t>ame </a:t>
+            </a:r>
+            <a:r>
+              <a:rPr lang="en-GB" sz="1400" dirty="0"/>
+              <a:t>for the security group itself because CloudFormation generates one </a:t>
+            </a:r>
+            <a:r>
+              <a:rPr lang="en-GB" sz="1400" dirty="0" smtClean="0"/>
+              <a:t>automatically</a:t>
+            </a:r>
+          </a:p>
+          <a:p>
+            <a:r>
+              <a:rPr lang="en-GB" sz="1400" b="1" dirty="0" smtClean="0"/>
+              <a:t>Outputs:</a:t>
+            </a:r>
+            <a:r>
+              <a:rPr lang="en-GB" sz="1400" dirty="0" smtClean="0"/>
+              <a:t> Tab has the EC2 or resource URL</a:t>
+            </a:r>
+            <a:endParaRPr lang="en-GB" sz="1400" dirty="0"/>
+          </a:p>
+          <a:p>
+            <a:pPr marL="0" indent="0">
+              <a:buNone/>
+            </a:pPr>
+            <a:endParaRPr lang="en-GB" sz="1400" dirty="0"/>
+          </a:p>
+        </p:txBody>
+      </p:sp>
+    </p:spTree>
+    <p:extLst>
+      <p:ext uri="{BB962C8B-B14F-4D97-AF65-F5344CB8AC3E}">
+        <p14:creationId xmlns:p14="http://schemas.microsoft.com/office/powerpoint/2010/main" val="1702303031"/>
+      </p:ext>
+    </p:extLst>
+  </p:cSld>
+  <p:clrMapOvr>
+    <a:masterClrMapping/>
+  </p:clrMapOvr>
+  <p:timing>
+    <p:tnLst>
+      <p:par>
+        <p:cTn id="1" dur="indefinite" restart="never" nodeType="tmRoot"/>
+      </p:par>
+    </p:tnLst>
+  </p:timing>
+</p:sld>
+</file>
+
+<file path=ppt/slides/slide21.xml><?xml version="1.0" encoding="utf-8"?>
+<p:sld xmlns:a="http://schemas.openxmlformats.org/drawingml/2006/main" xmlns:r="http://schemas.openxmlformats.org/officeDocument/2006/relationships" xmlns:p="http://schemas.openxmlformats.org/presentationml/2006/main">
+  <p:cSld>
+    <p:spTree>
+      <p:nvGrpSpPr>
+        <p:cNvPr id="1" name=""/>
+        <p:cNvGrpSpPr/>
+        <p:nvPr/>
+      </p:nvGrpSpPr>
+      <p:grpSpPr>
+        <a:xfrm>
+          <a:off x="0" y="0"/>
+          <a:ext cx="0" cy="0"/>
+          <a:chOff x="0" y="0"/>
+          <a:chExt cx="0" cy="0"/>
+        </a:xfrm>
+      </p:grpSpPr>
+      <p:sp>
+        <p:nvSpPr>
+          <p:cNvPr id="2" name="Title 1"/>
+          <p:cNvSpPr>
+            <a:spLocks noGrp="1"/>
+          </p:cNvSpPr>
+          <p:nvPr>
+            <p:ph type="title"/>
+          </p:nvPr>
+        </p:nvSpPr>
+        <p:spPr/>
+        <p:txBody>
+          <a:bodyPr/>
+          <a:lstStyle/>
+          <a:p>
+            <a:r>
+              <a:rPr lang="en-US" dirty="0" smtClean="0"/>
+              <a:t>ELB</a:t>
+            </a:r>
+            <a:endParaRPr lang="en-US" dirty="0"/>
+          </a:p>
+        </p:txBody>
+      </p:sp>
+      <p:sp>
+        <p:nvSpPr>
+          <p:cNvPr id="3" name="Content Placeholder 2"/>
+          <p:cNvSpPr>
+            <a:spLocks noGrp="1"/>
+          </p:cNvSpPr>
+          <p:nvPr>
+            <p:ph idx="1"/>
+          </p:nvPr>
+        </p:nvSpPr>
+        <p:spPr/>
+        <p:txBody>
+          <a:bodyPr>
+            <a:normAutofit/>
+          </a:bodyPr>
+          <a:lstStyle/>
+          <a:p>
+            <a:r>
+              <a:rPr lang="en-GB" sz="1400" dirty="0" smtClean="0"/>
+              <a:t>ELB Protocols supported – HTTP, HTTPS, TCP, SSL. </a:t>
+            </a:r>
+            <a:r>
+              <a:rPr lang="en-GB" sz="1400" b="1" dirty="0" smtClean="0">
+                <a:solidFill>
+                  <a:srgbClr val="FF0000"/>
+                </a:solidFill>
+              </a:rPr>
+              <a:t>SSH protocol</a:t>
+            </a:r>
+            <a:r>
+              <a:rPr lang="en-GB" sz="1400" dirty="0" smtClean="0"/>
+              <a:t> is not supported.</a:t>
+            </a:r>
+          </a:p>
+          <a:p>
+            <a:r>
+              <a:rPr lang="en-GB" sz="1400" dirty="0"/>
+              <a:t>Elastic Load Balancers can be enabled within a single Availability Zone or across multiple zones for greater consistent application </a:t>
+            </a:r>
+            <a:r>
+              <a:rPr lang="en-GB" sz="1400" dirty="0" smtClean="0"/>
+              <a:t>performance</a:t>
+            </a:r>
+          </a:p>
+          <a:p>
+            <a:r>
+              <a:rPr lang="en-GB" sz="1400" dirty="0"/>
+              <a:t>By default, your Classic Load Balancer distributes incoming requests evenly across</a:t>
+            </a:r>
+            <a:r>
+              <a:rPr lang="en-GB" sz="1400" b="1" dirty="0">
+                <a:solidFill>
+                  <a:srgbClr val="00B050"/>
+                </a:solidFill>
+              </a:rPr>
+              <a:t> its enabled Availability Zones</a:t>
+            </a:r>
+            <a:r>
+              <a:rPr lang="en-GB" sz="1400" dirty="0"/>
+              <a:t>. For example, if you have ten instances in Availability Zone us-west-2a and two instances in us-west-2b, the requests are distributed evenly between the two Availability Zones. As a result, the two instances in us-west-2b serve the same amount of traffic as the ten instances in us-west-2a. To ensure that your load balancer distributes incoming requests evenly across all instances in its enabled Availability Zones, enable cross-zone load balancing</a:t>
+            </a:r>
+            <a:r>
+              <a:rPr lang="en-GB" sz="1400" dirty="0" smtClean="0"/>
+              <a:t>. </a:t>
+            </a:r>
+          </a:p>
+          <a:p>
+            <a:r>
+              <a:rPr lang="en-GB" sz="1400" b="1" dirty="0">
+                <a:solidFill>
+                  <a:srgbClr val="00B050"/>
+                </a:solidFill>
+              </a:rPr>
+              <a:t>Cross-zone load balancing</a:t>
+            </a:r>
+            <a:r>
+              <a:rPr lang="en-GB" sz="1400" dirty="0"/>
+              <a:t> reduces the need to maintain equivalent numbers of instances in each enabled Availability Zone, and improves your application's ability to handle the loss of one or more instances</a:t>
+            </a:r>
+            <a:r>
+              <a:rPr lang="en-GB" sz="1400" dirty="0" smtClean="0"/>
+              <a:t>.</a:t>
+            </a:r>
+          </a:p>
+          <a:p>
+            <a:r>
+              <a:rPr lang="en-GB" sz="1400" dirty="0" smtClean="0"/>
+              <a:t>Only Classic load balancer supports </a:t>
+            </a:r>
+            <a:r>
+              <a:rPr lang="en-GB" sz="1400" b="1" dirty="0" smtClean="0"/>
+              <a:t>TCP protocol </a:t>
+            </a:r>
+            <a:endParaRPr lang="en-GB" sz="1400" b="1" dirty="0" smtClean="0"/>
+          </a:p>
+          <a:p>
+            <a:endParaRPr lang="en-GB" sz="1400" dirty="0"/>
+          </a:p>
+        </p:txBody>
+      </p:sp>
+    </p:spTree>
+    <p:extLst>
+      <p:ext uri="{BB962C8B-B14F-4D97-AF65-F5344CB8AC3E}">
+        <p14:creationId xmlns:p14="http://schemas.microsoft.com/office/powerpoint/2010/main" val="1063432986"/>
+      </p:ext>
+    </p:extLst>
+  </p:cSld>
+  <p:clrMapOvr>
+    <a:masterClrMapping/>
+  </p:clrMapOvr>
+  <p:timing>
+    <p:tnLst>
+      <p:par>
+        <p:cTn id="1" dur="indefinite" restart="never" nodeType="tmRoot"/>
+      </p:par>
+    </p:tnLst>
+  </p:timing>
+</p:sld>
+</file>
+
+<file path=ppt/slides/slide22.xml><?xml version="1.0" encoding="utf-8"?>
+<p:sld xmlns:a="http://schemas.openxmlformats.org/drawingml/2006/main" xmlns:r="http://schemas.openxmlformats.org/officeDocument/2006/relationships" xmlns:p="http://schemas.openxmlformats.org/presentationml/2006/main">
+  <p:cSld>
+    <p:spTree>
+      <p:nvGrpSpPr>
+        <p:cNvPr id="1" name=""/>
+        <p:cNvGrpSpPr/>
+        <p:nvPr/>
+      </p:nvGrpSpPr>
+      <p:grpSpPr>
+        <a:xfrm>
+          <a:off x="0" y="0"/>
+          <a:ext cx="0" cy="0"/>
+          <a:chOff x="0" y="0"/>
+          <a:chExt cx="0" cy="0"/>
+        </a:xfrm>
+      </p:grpSpPr>
+      <p:sp>
+        <p:nvSpPr>
+          <p:cNvPr id="2" name="Title 1"/>
+          <p:cNvSpPr>
+            <a:spLocks noGrp="1"/>
+          </p:cNvSpPr>
+          <p:nvPr>
+            <p:ph type="title"/>
+          </p:nvPr>
+        </p:nvSpPr>
+        <p:spPr/>
+        <p:txBody>
+          <a:bodyPr/>
+          <a:lstStyle/>
+          <a:p>
+            <a:r>
+              <a:rPr lang="en-US" dirty="0" smtClean="0"/>
+              <a:t>EC2</a:t>
+            </a:r>
+            <a:endParaRPr lang="en-US" dirty="0"/>
+          </a:p>
+        </p:txBody>
+      </p:sp>
+      <p:sp>
+        <p:nvSpPr>
+          <p:cNvPr id="3" name="Content Placeholder 2"/>
+          <p:cNvSpPr>
+            <a:spLocks noGrp="1"/>
+          </p:cNvSpPr>
+          <p:nvPr>
+            <p:ph idx="1"/>
+          </p:nvPr>
+        </p:nvSpPr>
+        <p:spPr/>
+        <p:txBody>
+          <a:bodyPr>
+            <a:normAutofit/>
+          </a:bodyPr>
+          <a:lstStyle/>
+          <a:p>
+            <a:r>
+              <a:rPr lang="en-GB" sz="1400" dirty="0"/>
+              <a:t>By default, Amazon EBS root device volumes are </a:t>
+            </a:r>
+            <a:r>
+              <a:rPr lang="en-GB" sz="1400" b="1" dirty="0">
+                <a:solidFill>
+                  <a:srgbClr val="FF0000"/>
+                </a:solidFill>
+              </a:rPr>
+              <a:t>automatically deleted </a:t>
+            </a:r>
+            <a:r>
+              <a:rPr lang="en-GB" sz="1400" dirty="0"/>
+              <a:t>when the instance terminates</a:t>
+            </a:r>
+            <a:r>
+              <a:rPr lang="en-GB" sz="1400" dirty="0" smtClean="0"/>
+              <a:t>.</a:t>
+            </a:r>
+          </a:p>
+          <a:p>
+            <a:r>
+              <a:rPr lang="en-GB" sz="1400" dirty="0"/>
+              <a:t>Your existing software license is tied to physical cores and sockets.  Since AWS provides virtual instances, what option does AWS have for existing software licenses at hardware level</a:t>
+            </a:r>
+            <a:r>
+              <a:rPr lang="en-GB" sz="1400" dirty="0" smtClean="0"/>
+              <a:t>? Answer: Use dedicated </a:t>
+            </a:r>
+            <a:r>
+              <a:rPr lang="en-GB" sz="1400" b="1" dirty="0" smtClean="0"/>
+              <a:t>hosts</a:t>
+            </a:r>
+            <a:r>
+              <a:rPr lang="en-GB" sz="1400" dirty="0" smtClean="0"/>
+              <a:t> to obtain a single tenant hardware and use your </a:t>
+            </a:r>
+            <a:r>
+              <a:rPr lang="en-GB" sz="1400" dirty="0" smtClean="0"/>
+              <a:t>license</a:t>
+            </a:r>
+          </a:p>
+          <a:p>
+            <a:r>
+              <a:rPr lang="en-GB" sz="1400" dirty="0" smtClean="0"/>
+              <a:t>Multiple EBS volumes can be attached to an instance. However, a volume can be associated with only one instance</a:t>
+            </a:r>
+          </a:p>
+          <a:p>
+            <a:r>
+              <a:rPr lang="en-GB" sz="1400" b="1" dirty="0" smtClean="0"/>
+              <a:t>Elastic File Store</a:t>
+            </a:r>
+            <a:r>
+              <a:rPr lang="en-GB" sz="1400" dirty="0" smtClean="0"/>
+              <a:t> </a:t>
+            </a:r>
+            <a:r>
+              <a:rPr lang="en-GB" sz="1400" dirty="0"/>
+              <a:t>supports one to thousands of Amazon EC2 instances connecting to a file system </a:t>
+            </a:r>
+            <a:r>
+              <a:rPr lang="en-GB" sz="1400" dirty="0" smtClean="0"/>
+              <a:t>concurrently</a:t>
+            </a:r>
+          </a:p>
+          <a:p>
+            <a:r>
+              <a:rPr lang="en-GB" sz="1400" dirty="0" smtClean="0"/>
+              <a:t>EBS </a:t>
+            </a:r>
+            <a:r>
+              <a:rPr lang="en-GB" sz="1400" dirty="0"/>
+              <a:t>offers seamless encryption of data volumes and </a:t>
+            </a:r>
+            <a:r>
+              <a:rPr lang="en-GB" sz="1400" dirty="0" smtClean="0"/>
+              <a:t>snapshots</a:t>
+            </a:r>
+            <a:endParaRPr lang="en-GB" sz="1400" dirty="0"/>
+          </a:p>
+          <a:p>
+            <a:r>
+              <a:rPr lang="en-GB" sz="1400" dirty="0" smtClean="0"/>
+              <a:t>EBS stores redundant copies across single AZ zone in a region</a:t>
+            </a:r>
+            <a:endParaRPr lang="en-GB" sz="1400" dirty="0"/>
+          </a:p>
+        </p:txBody>
+      </p:sp>
+    </p:spTree>
+    <p:extLst>
+      <p:ext uri="{BB962C8B-B14F-4D97-AF65-F5344CB8AC3E}">
+        <p14:creationId xmlns:p14="http://schemas.microsoft.com/office/powerpoint/2010/main" val="2423916325"/>
+      </p:ext>
+    </p:extLst>
+  </p:cSld>
+  <p:clrMapOvr>
+    <a:masterClrMapping/>
+  </p:clrMapOvr>
+  <p:timing>
+    <p:tnLst>
+      <p:par>
+        <p:cTn id="1" dur="indefinite" restart="never" nodeType="tmRoot"/>
+      </p:par>
+    </p:tnLst>
+  </p:timing>
+</p:sld>
+</file>
+
+<file path=ppt/slides/slide23.xml><?xml version="1.0" encoding="utf-8"?>
+<p:sld xmlns:a="http://schemas.openxmlformats.org/drawingml/2006/main" xmlns:r="http://schemas.openxmlformats.org/officeDocument/2006/relationships" xmlns:p="http://schemas.openxmlformats.org/presentationml/2006/main">
+  <p:cSld>
+    <p:spTree>
+      <p:nvGrpSpPr>
+        <p:cNvPr id="1" name=""/>
+        <p:cNvGrpSpPr/>
+        <p:nvPr/>
+      </p:nvGrpSpPr>
+      <p:grpSpPr>
+        <a:xfrm>
+          <a:off x="0" y="0"/>
+          <a:ext cx="0" cy="0"/>
+          <a:chOff x="0" y="0"/>
+          <a:chExt cx="0" cy="0"/>
+        </a:xfrm>
+      </p:grpSpPr>
+      <p:sp>
+        <p:nvSpPr>
+          <p:cNvPr id="2" name="Title 1"/>
+          <p:cNvSpPr>
+            <a:spLocks noGrp="1"/>
+          </p:cNvSpPr>
+          <p:nvPr>
+            <p:ph type="title"/>
+          </p:nvPr>
+        </p:nvSpPr>
+        <p:spPr/>
+        <p:txBody>
+          <a:bodyPr/>
+          <a:lstStyle/>
+          <a:p>
+            <a:r>
+              <a:rPr lang="en-US" dirty="0" smtClean="0"/>
+              <a:t>Route 53</a:t>
+            </a:r>
+            <a:endParaRPr lang="en-US" dirty="0"/>
+          </a:p>
+        </p:txBody>
+      </p:sp>
+      <p:sp>
+        <p:nvSpPr>
+          <p:cNvPr id="3" name="Content Placeholder 2"/>
+          <p:cNvSpPr>
+            <a:spLocks noGrp="1"/>
+          </p:cNvSpPr>
+          <p:nvPr>
+            <p:ph idx="1"/>
+          </p:nvPr>
+        </p:nvSpPr>
+        <p:spPr/>
+        <p:txBody>
+          <a:bodyPr>
+            <a:normAutofit/>
+          </a:bodyPr>
+          <a:lstStyle/>
+          <a:p>
+            <a:r>
+              <a:rPr lang="en-GB" sz="1400" dirty="0"/>
+              <a:t>You can set up a variety of failover configurations using Amazon Route 53 alias: weighted, latency, geolocation routing, and failover resource record sets.</a:t>
+            </a:r>
+          </a:p>
+          <a:p>
+            <a:r>
+              <a:rPr lang="en-GB" sz="1400" b="1" dirty="0"/>
+              <a:t>Active-active failover:</a:t>
+            </a:r>
+            <a:r>
+              <a:rPr lang="en-GB" sz="1400" dirty="0"/>
+              <a:t> Use this failover configuration when you want all of your resources to be available the majority of the time. When a resource becomes unavailable, Amazon Route 53 can detect that it's unhealthy and stop including it when responding to queries.</a:t>
+            </a:r>
+            <a:br>
+              <a:rPr lang="en-GB" sz="1400" dirty="0"/>
+            </a:br>
+            <a:r>
+              <a:rPr lang="en-GB" sz="1400" b="1" dirty="0"/>
+              <a:t>Active-passive failover:</a:t>
+            </a:r>
+            <a:r>
+              <a:rPr lang="en-GB" sz="1400" dirty="0"/>
+              <a:t> Use this failover configuration when you want a primary group of resources to be available the majority of the time and you want a secondary group of resources to be on standby in case all of the primary resources become unavailable. When responding to queries, Amazon Route 53 includes only the healthy primary resources. If all of the primary resources are unhealthy, Amazon Route 53 begins to include only the healthy secondary resources in response to DNS queries.</a:t>
+            </a:r>
+          </a:p>
+          <a:p>
+            <a:r>
+              <a:rPr lang="en-GB" sz="1400" b="1" dirty="0"/>
+              <a:t>Active-active-passive and other mixed configurations:</a:t>
+            </a:r>
+            <a:r>
+              <a:rPr lang="en-GB" sz="1400" dirty="0"/>
+              <a:t> You can combine alias and non-alias resource record sets to produce a variety of Amazon Route 53 </a:t>
+            </a:r>
+            <a:r>
+              <a:rPr lang="en-GB" sz="1400" dirty="0" err="1"/>
+              <a:t>behaviors</a:t>
+            </a:r>
+            <a:r>
+              <a:rPr lang="en-GB" sz="1400" dirty="0"/>
+              <a:t>.</a:t>
+            </a:r>
+          </a:p>
+        </p:txBody>
+      </p:sp>
+    </p:spTree>
+    <p:extLst>
+      <p:ext uri="{BB962C8B-B14F-4D97-AF65-F5344CB8AC3E}">
+        <p14:creationId xmlns:p14="http://schemas.microsoft.com/office/powerpoint/2010/main" val="3187936765"/>
+      </p:ext>
+    </p:extLst>
+  </p:cSld>
+  <p:clrMapOvr>
+    <a:masterClrMapping/>
+  </p:clrMapOvr>
+  <p:timing>
+    <p:tnLst>
+      <p:par>
+        <p:cTn id="1" dur="indefinite" restart="never" nodeType="tmRoot"/>
+      </p:par>
+    </p:tnLst>
+  </p:timing>
+</p:sld>
+</file>
+
+<file path=ppt/slides/slide24.xml><?xml version="1.0" encoding="utf-8"?>
+<p:sld xmlns:a="http://schemas.openxmlformats.org/drawingml/2006/main" xmlns:r="http://schemas.openxmlformats.org/officeDocument/2006/relationships" xmlns:p="http://schemas.openxmlformats.org/presentationml/2006/main">
+  <p:cSld>
+    <p:spTree>
+      <p:nvGrpSpPr>
+        <p:cNvPr id="1" name=""/>
+        <p:cNvGrpSpPr/>
+        <p:nvPr/>
+      </p:nvGrpSpPr>
+      <p:grpSpPr>
+        <a:xfrm>
+          <a:off x="0" y="0"/>
+          <a:ext cx="0" cy="0"/>
+          <a:chOff x="0" y="0"/>
+          <a:chExt cx="0" cy="0"/>
+        </a:xfrm>
+      </p:grpSpPr>
+      <p:sp>
+        <p:nvSpPr>
+          <p:cNvPr id="2" name="Title 1"/>
+          <p:cNvSpPr>
+            <a:spLocks noGrp="1"/>
+          </p:cNvSpPr>
+          <p:nvPr>
+            <p:ph type="title"/>
+          </p:nvPr>
+        </p:nvSpPr>
+        <p:spPr/>
+        <p:txBody>
+          <a:bodyPr/>
+          <a:lstStyle/>
+          <a:p>
+            <a:r>
+              <a:rPr lang="en-US" dirty="0" smtClean="0"/>
+              <a:t>IAM</a:t>
+            </a:r>
+            <a:endParaRPr lang="en-US" dirty="0"/>
+          </a:p>
+        </p:txBody>
+      </p:sp>
+      <p:sp>
+        <p:nvSpPr>
+          <p:cNvPr id="3" name="Content Placeholder 2"/>
+          <p:cNvSpPr>
+            <a:spLocks noGrp="1"/>
+          </p:cNvSpPr>
+          <p:nvPr>
+            <p:ph idx="1"/>
+          </p:nvPr>
+        </p:nvSpPr>
+        <p:spPr/>
+        <p:txBody>
+          <a:bodyPr>
+            <a:normAutofit/>
+          </a:bodyPr>
+          <a:lstStyle/>
+          <a:p>
+            <a:r>
+              <a:rPr lang="en-GB" sz="1400" dirty="0"/>
+              <a:t>AWS Identity and Access Management (IAM) is a web service that helps you securely control access to AWS resources for your users. You can specify permission to a single user or you can use groups to specify permissions for a collection of users, which can make those permissions easier to manage for those users. Furthermore you can use a </a:t>
+            </a:r>
+            <a:r>
+              <a:rPr lang="en-GB" sz="1400" b="1" dirty="0"/>
+              <a:t>Role</a:t>
+            </a:r>
+            <a:r>
+              <a:rPr lang="en-GB" sz="1400" dirty="0"/>
+              <a:t> for grant authorization to </a:t>
+            </a:r>
+            <a:r>
+              <a:rPr lang="en-GB" sz="1400" dirty="0" smtClean="0"/>
+              <a:t>AWS resources </a:t>
+            </a:r>
+            <a:r>
+              <a:rPr lang="en-GB" sz="1400" dirty="0"/>
+              <a:t>without any credentials (password or access keys) directly associated with </a:t>
+            </a:r>
+            <a:r>
+              <a:rPr lang="en-GB" sz="1400" dirty="0" smtClean="0"/>
+              <a:t>it</a:t>
+            </a:r>
+            <a:endParaRPr lang="en-GB" sz="1400" dirty="0"/>
+          </a:p>
+          <a:p>
+            <a:r>
+              <a:rPr lang="en-GB" sz="1400" dirty="0"/>
+              <a:t>You can create customer managed policies to define sets of permissions to attach to principal entities (users, groups, and roles) in your AWS account</a:t>
+            </a:r>
+            <a:r>
+              <a:rPr lang="en-GB" sz="1400" dirty="0" smtClean="0"/>
+              <a:t>.</a:t>
+            </a:r>
+          </a:p>
+          <a:p>
+            <a:r>
+              <a:rPr lang="en-GB" sz="1400" dirty="0"/>
+              <a:t>Instead of creating and distributing your AWS credentials, you can delegate permission to making API requests using </a:t>
+            </a:r>
+            <a:r>
+              <a:rPr lang="en-GB" sz="1400" b="1" dirty="0"/>
+              <a:t>IAM roles</a:t>
+            </a:r>
+            <a:r>
+              <a:rPr lang="en-GB" sz="1400" dirty="0" smtClean="0"/>
+              <a:t>.</a:t>
+            </a:r>
+          </a:p>
+          <a:p>
+            <a:r>
+              <a:rPr lang="en-GB" sz="1400" dirty="0"/>
+              <a:t>ARN is transformed to the </a:t>
+            </a:r>
+            <a:r>
+              <a:rPr lang="en-GB" sz="1400" dirty="0">
+                <a:solidFill>
+                  <a:srgbClr val="FF0000"/>
+                </a:solidFill>
+              </a:rPr>
+              <a:t>user's unique principal ID </a:t>
+            </a:r>
+            <a:r>
+              <a:rPr lang="en-GB" sz="1400" dirty="0"/>
+              <a:t>when the policy is saved. This helps mitigate the risk of someone escalating their privileges by removing and recreating the user</a:t>
+            </a:r>
+            <a:r>
+              <a:rPr lang="en-GB" sz="1400" dirty="0" smtClean="0"/>
+              <a:t>.</a:t>
+            </a:r>
+          </a:p>
+          <a:p>
+            <a:r>
+              <a:rPr lang="en-GB" sz="1400" dirty="0" smtClean="0"/>
+              <a:t>You can’t create hierarchies of IAM group</a:t>
+            </a:r>
+            <a:endParaRPr lang="en-GB" sz="1400" dirty="0"/>
+          </a:p>
+        </p:txBody>
+      </p:sp>
+    </p:spTree>
+    <p:extLst>
+      <p:ext uri="{BB962C8B-B14F-4D97-AF65-F5344CB8AC3E}">
+        <p14:creationId xmlns:p14="http://schemas.microsoft.com/office/powerpoint/2010/main" val="2837002944"/>
+      </p:ext>
+    </p:extLst>
+  </p:cSld>
+  <p:clrMapOvr>
+    <a:masterClrMapping/>
+  </p:clrMapOvr>
+  <p:timing>
+    <p:tnLst>
+      <p:par>
+        <p:cTn id="1" dur="indefinite" restart="never" nodeType="tmRoot"/>
+      </p:par>
+    </p:tnLst>
+  </p:timing>
+</p:sld>
+</file>
+
+<file path=ppt/slides/slide25.xml><?xml version="1.0" encoding="utf-8"?>
+<p:sld xmlns:a="http://schemas.openxmlformats.org/drawingml/2006/main" xmlns:r="http://schemas.openxmlformats.org/officeDocument/2006/relationships" xmlns:p="http://schemas.openxmlformats.org/presentationml/2006/main">
+  <p:cSld>
+    <p:spTree>
+      <p:nvGrpSpPr>
+        <p:cNvPr id="1" name=""/>
+        <p:cNvGrpSpPr/>
+        <p:nvPr/>
+      </p:nvGrpSpPr>
+      <p:grpSpPr>
+        <a:xfrm>
+          <a:off x="0" y="0"/>
+          <a:ext cx="0" cy="0"/>
+          <a:chOff x="0" y="0"/>
+          <a:chExt cx="0" cy="0"/>
+        </a:xfrm>
+      </p:grpSpPr>
+      <p:sp>
+        <p:nvSpPr>
+          <p:cNvPr id="2" name="Title 1"/>
+          <p:cNvSpPr>
+            <a:spLocks noGrp="1"/>
+          </p:cNvSpPr>
+          <p:nvPr>
+            <p:ph type="title"/>
+          </p:nvPr>
+        </p:nvSpPr>
+        <p:spPr/>
+        <p:txBody>
+          <a:bodyPr/>
+          <a:lstStyle/>
+          <a:p>
+            <a:r>
+              <a:rPr lang="en-US" dirty="0" smtClean="0"/>
+              <a:t>Bastion Host</a:t>
+            </a:r>
+            <a:endParaRPr lang="en-US" dirty="0"/>
+          </a:p>
+        </p:txBody>
+      </p:sp>
+      <p:sp>
+        <p:nvSpPr>
+          <p:cNvPr id="3" name="Content Placeholder 2"/>
+          <p:cNvSpPr>
+            <a:spLocks noGrp="1"/>
+          </p:cNvSpPr>
+          <p:nvPr>
+            <p:ph idx="1"/>
+          </p:nvPr>
+        </p:nvSpPr>
+        <p:spPr/>
+        <p:txBody>
+          <a:bodyPr>
+            <a:normAutofit/>
+          </a:bodyPr>
+          <a:lstStyle/>
+          <a:p>
+            <a:r>
+              <a:rPr lang="en-GB" sz="1400" dirty="0"/>
+              <a:t>Including bastion hosts in your VPC environment enables you to </a:t>
+            </a:r>
+            <a:r>
+              <a:rPr lang="en-GB" sz="1400" b="1" dirty="0">
+                <a:solidFill>
+                  <a:srgbClr val="00B050"/>
+                </a:solidFill>
+              </a:rPr>
+              <a:t>securely connect to your Linux instances without exposing your environment to the Internet</a:t>
+            </a:r>
+            <a:r>
+              <a:rPr lang="en-GB" sz="1400" dirty="0"/>
+              <a:t>. After you set up your bastion hosts, you can access the other instances in your VPC through Secure Shell (SSH) connections on Linux. Bastion hosts are also configured with security groups to provide fine-grained ingress control.</a:t>
+            </a:r>
+          </a:p>
+        </p:txBody>
+      </p:sp>
+    </p:spTree>
+    <p:extLst>
+      <p:ext uri="{BB962C8B-B14F-4D97-AF65-F5344CB8AC3E}">
+        <p14:creationId xmlns:p14="http://schemas.microsoft.com/office/powerpoint/2010/main" val="1088042738"/>
+      </p:ext>
+    </p:extLst>
+  </p:cSld>
+  <p:clrMapOvr>
+    <a:masterClrMapping/>
+  </p:clrMapOvr>
+  <p:timing>
+    <p:tnLst>
+      <p:par>
+        <p:cTn id="1" dur="indefinite" restart="never" nodeType="tmRoot"/>
+      </p:par>
+    </p:tnLst>
+  </p:timing>
+</p:sld>
+</file>
+
+<file path=ppt/slides/slide26.xml><?xml version="1.0" encoding="utf-8"?>
+<p:sld xmlns:a="http://schemas.openxmlformats.org/drawingml/2006/main" xmlns:r="http://schemas.openxmlformats.org/officeDocument/2006/relationships" xmlns:p="http://schemas.openxmlformats.org/presentationml/2006/main">
+  <p:cSld>
+    <p:spTree>
+      <p:nvGrpSpPr>
+        <p:cNvPr id="1" name=""/>
+        <p:cNvGrpSpPr/>
+        <p:nvPr/>
+      </p:nvGrpSpPr>
+      <p:grpSpPr>
+        <a:xfrm>
+          <a:off x="0" y="0"/>
+          <a:ext cx="0" cy="0"/>
+          <a:chOff x="0" y="0"/>
+          <a:chExt cx="0" cy="0"/>
+        </a:xfrm>
+      </p:grpSpPr>
+      <p:sp>
+        <p:nvSpPr>
+          <p:cNvPr id="2" name="Title 1"/>
+          <p:cNvSpPr>
+            <a:spLocks noGrp="1"/>
+          </p:cNvSpPr>
+          <p:nvPr>
+            <p:ph type="title"/>
+          </p:nvPr>
+        </p:nvSpPr>
+        <p:spPr/>
+        <p:txBody>
+          <a:bodyPr/>
+          <a:lstStyle/>
+          <a:p>
+            <a:r>
+              <a:rPr lang="en-US" dirty="0" smtClean="0"/>
+              <a:t>Network ACL</a:t>
+            </a:r>
+            <a:endParaRPr lang="en-US" dirty="0"/>
+          </a:p>
+        </p:txBody>
+      </p:sp>
+      <p:sp>
+        <p:nvSpPr>
+          <p:cNvPr id="3" name="Content Placeholder 2"/>
+          <p:cNvSpPr>
+            <a:spLocks noGrp="1"/>
+          </p:cNvSpPr>
+          <p:nvPr>
+            <p:ph idx="1"/>
+          </p:nvPr>
+        </p:nvSpPr>
+        <p:spPr/>
+        <p:txBody>
+          <a:bodyPr>
+            <a:normAutofit/>
+          </a:bodyPr>
+          <a:lstStyle/>
+          <a:p>
+            <a:r>
+              <a:rPr lang="en-GB" sz="1400" dirty="0" smtClean="0"/>
+              <a:t>Stateless</a:t>
+            </a:r>
+          </a:p>
+          <a:p>
+            <a:r>
+              <a:rPr lang="en-GB" sz="1400" dirty="0" smtClean="0"/>
+              <a:t>The rules are executed in order</a:t>
+            </a:r>
+          </a:p>
+          <a:p>
+            <a:r>
+              <a:rPr lang="en-GB" sz="1400" dirty="0"/>
+              <a:t>ACLs process strictly by rule number and processes the rules until a matching one is found</a:t>
+            </a:r>
+          </a:p>
+        </p:txBody>
+      </p:sp>
+    </p:spTree>
+    <p:extLst>
+      <p:ext uri="{BB962C8B-B14F-4D97-AF65-F5344CB8AC3E}">
+        <p14:creationId xmlns:p14="http://schemas.microsoft.com/office/powerpoint/2010/main" val="3344026197"/>
+      </p:ext>
+    </p:extLst>
+  </p:cSld>
+  <p:clrMapOvr>
+    <a:masterClrMapping/>
+  </p:clrMapOvr>
+  <p:timing>
+    <p:tnLst>
+      <p:par>
+        <p:cTn id="1" dur="indefinite" restart="never" nodeType="tmRoot"/>
+      </p:par>
+    </p:tnLst>
+  </p:timing>
+</p:sld>
+</file>
+
+<file path=ppt/slides/slide27.xml><?xml version="1.0" encoding="utf-8"?>
+<p:sld xmlns:a="http://schemas.openxmlformats.org/drawingml/2006/main" xmlns:r="http://schemas.openxmlformats.org/officeDocument/2006/relationships" xmlns:p="http://schemas.openxmlformats.org/presentationml/2006/main">
+  <p:cSld>
+    <p:spTree>
+      <p:nvGrpSpPr>
+        <p:cNvPr id="1" name=""/>
+        <p:cNvGrpSpPr/>
+        <p:nvPr/>
+      </p:nvGrpSpPr>
+      <p:grpSpPr>
+        <a:xfrm>
+          <a:off x="0" y="0"/>
+          <a:ext cx="0" cy="0"/>
+          <a:chOff x="0" y="0"/>
+          <a:chExt cx="0" cy="0"/>
+        </a:xfrm>
+      </p:grpSpPr>
+      <p:sp>
+        <p:nvSpPr>
+          <p:cNvPr id="2" name="Title 1"/>
+          <p:cNvSpPr>
+            <a:spLocks noGrp="1"/>
+          </p:cNvSpPr>
+          <p:nvPr>
+            <p:ph type="title"/>
+          </p:nvPr>
+        </p:nvSpPr>
+        <p:spPr/>
+        <p:txBody>
+          <a:bodyPr/>
+          <a:lstStyle/>
+          <a:p>
+            <a:r>
+              <a:rPr lang="en-US" dirty="0" smtClean="0"/>
+              <a:t>Security Groups</a:t>
+            </a:r>
+            <a:endParaRPr lang="en-US" dirty="0"/>
+          </a:p>
+        </p:txBody>
+      </p:sp>
+      <p:sp>
+        <p:nvSpPr>
+          <p:cNvPr id="3" name="Content Placeholder 2"/>
+          <p:cNvSpPr>
+            <a:spLocks noGrp="1"/>
+          </p:cNvSpPr>
+          <p:nvPr>
+            <p:ph idx="1"/>
+          </p:nvPr>
+        </p:nvSpPr>
+        <p:spPr/>
+        <p:txBody>
+          <a:bodyPr>
+            <a:normAutofit/>
+          </a:bodyPr>
+          <a:lstStyle/>
+          <a:p>
+            <a:r>
+              <a:rPr lang="en-GB" sz="1400" dirty="0" err="1" smtClean="0"/>
+              <a:t>Stateful</a:t>
+            </a:r>
+            <a:endParaRPr lang="en-GB" sz="1400" dirty="0" smtClean="0"/>
+          </a:p>
+          <a:p>
+            <a:r>
+              <a:rPr lang="en-GB" sz="1400" dirty="0" smtClean="0"/>
+              <a:t>Doesn’t have deny rules</a:t>
+            </a:r>
+          </a:p>
+          <a:p>
+            <a:r>
+              <a:rPr lang="en-GB" sz="1400" dirty="0"/>
+              <a:t>Security Group consolidates all rules and evaluates all of them before deciding if traffic is allowed</a:t>
+            </a:r>
+          </a:p>
+        </p:txBody>
+      </p:sp>
+    </p:spTree>
+    <p:extLst>
+      <p:ext uri="{BB962C8B-B14F-4D97-AF65-F5344CB8AC3E}">
+        <p14:creationId xmlns:p14="http://schemas.microsoft.com/office/powerpoint/2010/main" val="1430671880"/>
+      </p:ext>
+    </p:extLst>
+  </p:cSld>
+  <p:clrMapOvr>
+    <a:masterClrMapping/>
+  </p:clrMapOvr>
+  <p:timing>
+    <p:tnLst>
+      <p:par>
+        <p:cTn id="1" dur="indefinite" restart="never" nodeType="tmRoot"/>
+      </p:par>
+    </p:tnLst>
+  </p:timing>
+</p:sld>
+</file>
+
+<file path=ppt/slides/slide28.xml><?xml version="1.0" encoding="utf-8"?>
+<p:sld xmlns:a="http://schemas.openxmlformats.org/drawingml/2006/main" xmlns:r="http://schemas.openxmlformats.org/officeDocument/2006/relationships" xmlns:p="http://schemas.openxmlformats.org/presentationml/2006/main">
+  <p:cSld>
+    <p:spTree>
+      <p:nvGrpSpPr>
+        <p:cNvPr id="1" name=""/>
+        <p:cNvGrpSpPr/>
+        <p:nvPr/>
+      </p:nvGrpSpPr>
+      <p:grpSpPr>
+        <a:xfrm>
+          <a:off x="0" y="0"/>
+          <a:ext cx="0" cy="0"/>
+          <a:chOff x="0" y="0"/>
+          <a:chExt cx="0" cy="0"/>
+        </a:xfrm>
+      </p:grpSpPr>
+      <p:sp>
+        <p:nvSpPr>
+          <p:cNvPr id="2" name="Title 1"/>
+          <p:cNvSpPr>
+            <a:spLocks noGrp="1"/>
+          </p:cNvSpPr>
+          <p:nvPr>
+            <p:ph type="title"/>
+          </p:nvPr>
+        </p:nvSpPr>
+        <p:spPr/>
+        <p:txBody>
+          <a:bodyPr/>
+          <a:lstStyle/>
+          <a:p>
+            <a:r>
+              <a:rPr lang="en-US" dirty="0" smtClean="0"/>
+              <a:t>S3</a:t>
+            </a:r>
+            <a:endParaRPr lang="en-US" dirty="0"/>
+          </a:p>
+        </p:txBody>
+      </p:sp>
+      <p:sp>
+        <p:nvSpPr>
+          <p:cNvPr id="3" name="Content Placeholder 2"/>
+          <p:cNvSpPr>
+            <a:spLocks noGrp="1"/>
+          </p:cNvSpPr>
+          <p:nvPr>
+            <p:ph idx="1"/>
+          </p:nvPr>
+        </p:nvSpPr>
+        <p:spPr/>
+        <p:txBody>
+          <a:bodyPr>
+            <a:normAutofit/>
+          </a:bodyPr>
+          <a:lstStyle/>
+          <a:p>
+            <a:r>
+              <a:rPr lang="en-GB" sz="1400" dirty="0"/>
+              <a:t>For objects larger than </a:t>
+            </a:r>
+            <a:r>
+              <a:rPr lang="en-GB" sz="1400" b="1" dirty="0">
+                <a:solidFill>
+                  <a:srgbClr val="00B050"/>
+                </a:solidFill>
+              </a:rPr>
+              <a:t>100 megabytes</a:t>
+            </a:r>
+            <a:r>
+              <a:rPr lang="en-GB" sz="1400" dirty="0"/>
+              <a:t>, you should consider using the </a:t>
+            </a:r>
+            <a:r>
+              <a:rPr lang="en-GB" sz="1400" b="1" dirty="0">
+                <a:solidFill>
+                  <a:srgbClr val="00B050"/>
+                </a:solidFill>
+              </a:rPr>
+              <a:t>Multipart Upload </a:t>
+            </a:r>
+            <a:r>
+              <a:rPr lang="en-GB" sz="1400" dirty="0"/>
+              <a:t>capability</a:t>
+            </a:r>
+            <a:r>
+              <a:rPr lang="en-GB" sz="1400" dirty="0" smtClean="0"/>
+              <a:t>.</a:t>
+            </a:r>
+          </a:p>
+          <a:p>
+            <a:r>
+              <a:rPr lang="en-GB" sz="1400" dirty="0"/>
+              <a:t>Probability of loss = 100 - durability</a:t>
+            </a:r>
+            <a:endParaRPr lang="en-GB" sz="1400" dirty="0"/>
+          </a:p>
+        </p:txBody>
+      </p:sp>
+    </p:spTree>
+    <p:extLst>
+      <p:ext uri="{BB962C8B-B14F-4D97-AF65-F5344CB8AC3E}">
+        <p14:creationId xmlns:p14="http://schemas.microsoft.com/office/powerpoint/2010/main" val="2927686955"/>
+      </p:ext>
+    </p:extLst>
+  </p:cSld>
+  <p:clrMapOvr>
+    <a:masterClrMapping/>
+  </p:clrMapOvr>
+  <p:timing>
+    <p:tnLst>
+      <p:par>
+        <p:cTn id="1" dur="indefinite" restart="never" nodeType="tmRoot"/>
+      </p:par>
+    </p:tnLst>
+  </p:timing>
+</p:sld>
+</file>
+
+<file path=ppt/slides/slide29.xml><?xml version="1.0" encoding="utf-8"?>
+<p:sld xmlns:a="http://schemas.openxmlformats.org/drawingml/2006/main" xmlns:r="http://schemas.openxmlformats.org/officeDocument/2006/relationships" xmlns:p="http://schemas.openxmlformats.org/presentationml/2006/main">
+  <p:cSld>
+    <p:spTree>
+      <p:nvGrpSpPr>
+        <p:cNvPr id="1" name=""/>
+        <p:cNvGrpSpPr/>
+        <p:nvPr/>
+      </p:nvGrpSpPr>
+      <p:grpSpPr>
+        <a:xfrm>
+          <a:off x="0" y="0"/>
+          <a:ext cx="0" cy="0"/>
+          <a:chOff x="0" y="0"/>
+          <a:chExt cx="0" cy="0"/>
+        </a:xfrm>
+      </p:grpSpPr>
+      <p:sp>
+        <p:nvSpPr>
+          <p:cNvPr id="2" name="Title 1"/>
+          <p:cNvSpPr>
+            <a:spLocks noGrp="1"/>
+          </p:cNvSpPr>
+          <p:nvPr>
+            <p:ph type="title"/>
+          </p:nvPr>
+        </p:nvSpPr>
+        <p:spPr/>
+        <p:txBody>
+          <a:bodyPr/>
+          <a:lstStyle/>
+          <a:p>
+            <a:r>
+              <a:rPr lang="en-US" dirty="0" smtClean="0"/>
+              <a:t>Glacier</a:t>
+            </a:r>
+            <a:endParaRPr lang="en-US" dirty="0"/>
+          </a:p>
+        </p:txBody>
+      </p:sp>
+      <p:sp>
+        <p:nvSpPr>
+          <p:cNvPr id="3" name="Content Placeholder 2"/>
+          <p:cNvSpPr>
+            <a:spLocks noGrp="1"/>
+          </p:cNvSpPr>
+          <p:nvPr>
+            <p:ph idx="1"/>
+          </p:nvPr>
+        </p:nvSpPr>
+        <p:spPr/>
+        <p:txBody>
+          <a:bodyPr>
+            <a:normAutofit/>
+          </a:bodyPr>
+          <a:lstStyle/>
+          <a:p>
+            <a:r>
+              <a:rPr lang="en-GB" sz="1400" dirty="0" smtClean="0"/>
+              <a:t>Every Glacier storage object has a </a:t>
+            </a:r>
+            <a:r>
+              <a:rPr lang="en-GB" sz="1400" b="1" dirty="0" smtClean="0">
+                <a:solidFill>
+                  <a:srgbClr val="00B050"/>
+                </a:solidFill>
+              </a:rPr>
+              <a:t>8 KB metadata </a:t>
+            </a:r>
+            <a:r>
+              <a:rPr lang="en-GB" sz="1400" dirty="0" smtClean="0"/>
+              <a:t>stored in S3 and </a:t>
+            </a:r>
+            <a:r>
+              <a:rPr lang="en-GB" sz="1400" b="1" dirty="0" smtClean="0">
+                <a:solidFill>
+                  <a:srgbClr val="00B050"/>
+                </a:solidFill>
+              </a:rPr>
+              <a:t>32 KB metadata </a:t>
+            </a:r>
+            <a:r>
+              <a:rPr lang="en-GB" sz="1400" dirty="0" smtClean="0"/>
+              <a:t>stored in Glacier. So, it is not efficient to store small objects in Glacier</a:t>
+            </a:r>
+          </a:p>
+          <a:p>
+            <a:pPr marL="0" indent="0">
+              <a:buNone/>
+            </a:pPr>
+            <a:endParaRPr lang="en-GB" sz="1400" dirty="0"/>
+          </a:p>
+        </p:txBody>
+      </p:sp>
+    </p:spTree>
+    <p:extLst>
+      <p:ext uri="{BB962C8B-B14F-4D97-AF65-F5344CB8AC3E}">
+        <p14:creationId xmlns:p14="http://schemas.microsoft.com/office/powerpoint/2010/main" val="4066261835"/>
       </p:ext>
     </p:extLst>
   </p:cSld>
@@ -5190,7 +6983,123 @@
           <a:p>
             <a:r>
               <a:rPr lang="en-US" dirty="0" smtClean="0"/>
-              <a:t>Placement Group</a:t>
+              <a:t>VPC</a:t>
+            </a:r>
+            <a:endParaRPr lang="en-US" dirty="0"/>
+          </a:p>
+        </p:txBody>
+      </p:sp>
+      <p:pic>
+        <p:nvPicPr>
+          <p:cNvPr id="1026" name="Picture 2"/>
+          <p:cNvPicPr>
+            <a:picLocks noGrp="1" noChangeAspect="1" noChangeArrowheads="1"/>
+          </p:cNvPicPr>
+          <p:nvPr>
+            <p:ph idx="1"/>
+          </p:nvPr>
+        </p:nvPicPr>
+        <p:blipFill>
+          <a:blip r:embed="rId2">
+            <a:extLst>
+              <a:ext uri="{28A0092B-C50C-407E-A947-70E740481C1C}">
+                <a14:useLocalDpi xmlns:a14="http://schemas.microsoft.com/office/drawing/2010/main" val="0"/>
+              </a:ext>
+            </a:extLst>
+          </a:blip>
+          <a:srcRect/>
+          <a:stretch>
+            <a:fillRect/>
+          </a:stretch>
+        </p:blipFill>
+        <p:spPr bwMode="auto">
+          <a:xfrm>
+            <a:off x="611560" y="1772816"/>
+            <a:ext cx="6264696" cy="2664296"/>
+          </a:xfrm>
+          <a:prstGeom prst="rect">
+            <a:avLst/>
+          </a:prstGeom>
+          <a:noFill/>
+          <a:ln>
+            <a:noFill/>
+          </a:ln>
+          <a:extLst>
+            <a:ext uri="{909E8E84-426E-40DD-AFC4-6F175D3DCCD1}">
+              <a14:hiddenFill xmlns:a14="http://schemas.microsoft.com/office/drawing/2010/main">
+                <a:solidFill>
+                  <a:schemeClr val="accent1"/>
+                </a:solidFill>
+              </a14:hiddenFill>
+            </a:ext>
+            <a:ext uri="{91240B29-F687-4F45-9708-019B960494DF}">
+              <a14:hiddenLine xmlns:a14="http://schemas.microsoft.com/office/drawing/2010/main" w="9525">
+                <a:solidFill>
+                  <a:schemeClr val="tx1"/>
+                </a:solidFill>
+                <a:miter lim="800000"/>
+                <a:headEnd/>
+                <a:tailEnd/>
+              </a14:hiddenLine>
+            </a:ext>
+          </a:extLst>
+        </p:spPr>
+      </p:pic>
+    </p:spTree>
+    <p:extLst>
+      <p:ext uri="{BB962C8B-B14F-4D97-AF65-F5344CB8AC3E}">
+        <p14:creationId xmlns:p14="http://schemas.microsoft.com/office/powerpoint/2010/main" val="635269962"/>
+      </p:ext>
+    </p:extLst>
+  </p:cSld>
+  <p:clrMapOvr>
+    <a:masterClrMapping/>
+  </p:clrMapOvr>
+  <p:timing>
+    <p:tnLst>
+      <p:par>
+        <p:cTn id="1" dur="indefinite" restart="never" nodeType="tmRoot"/>
+      </p:par>
+    </p:tnLst>
+  </p:timing>
+</p:sld>
+</file>
+
+<file path=ppt/slides/slide30.xml><?xml version="1.0" encoding="utf-8"?>
+<p:sld xmlns:a="http://schemas.openxmlformats.org/drawingml/2006/main" xmlns:r="http://schemas.openxmlformats.org/officeDocument/2006/relationships" xmlns:p="http://schemas.openxmlformats.org/presentationml/2006/main">
+  <p:cSld>
+    <p:spTree>
+      <p:nvGrpSpPr>
+        <p:cNvPr id="1" name=""/>
+        <p:cNvGrpSpPr/>
+        <p:nvPr/>
+      </p:nvGrpSpPr>
+      <p:grpSpPr>
+        <a:xfrm>
+          <a:off x="0" y="0"/>
+          <a:ext cx="0" cy="0"/>
+          <a:chOff x="0" y="0"/>
+          <a:chExt cx="0" cy="0"/>
+        </a:xfrm>
+      </p:grpSpPr>
+      <p:sp>
+        <p:nvSpPr>
+          <p:cNvPr id="2" name="Title 1"/>
+          <p:cNvSpPr>
+            <a:spLocks noGrp="1"/>
+          </p:cNvSpPr>
+          <p:nvPr>
+            <p:ph type="title"/>
+          </p:nvPr>
+        </p:nvSpPr>
+        <p:spPr/>
+        <p:txBody>
+          <a:bodyPr/>
+          <a:lstStyle/>
+          <a:p>
+            <a:r>
+              <a:rPr lang="en-US" dirty="0" smtClean="0"/>
+              <a:t>SES</a:t>
             </a:r>
             <a:endParaRPr lang="en-US" dirty="0"/>
           </a:p>
@@ -5214,32 +7123,287 @@
           <a:lstStyle/>
           <a:p>
             <a:r>
-              <a:rPr lang="en-GB" sz="1400" dirty="0"/>
-              <a:t>A </a:t>
-            </a:r>
-            <a:r>
-              <a:rPr lang="en-GB" sz="1400" b="1" i="1" dirty="0"/>
-              <a:t>placement group</a:t>
-            </a:r>
-            <a:r>
-              <a:rPr lang="en-GB" sz="1400" dirty="0"/>
-              <a:t> is a logical grouping of instances within a single Availability Zone. Placement groups are recommended for applications that benefit </a:t>
-            </a:r>
-            <a:r>
-              <a:rPr lang="en-GB" sz="1400" b="1" dirty="0"/>
-              <a:t>from low network latency, high network throughput, or both</a:t>
-            </a:r>
-            <a:r>
-              <a:rPr lang="en-GB" sz="1400" dirty="0"/>
-              <a:t>. To provide the lowest latency, and the highest packet-per-second network performance for your placement group, choose an instance type that supports enhanced networking.</a:t>
-            </a:r>
+              <a:rPr lang="en-GB" sz="1400" dirty="0" smtClean="0"/>
+              <a:t>ISP or SES blocks the malicious content</a:t>
+            </a:r>
+          </a:p>
+          <a:p>
+            <a:r>
+              <a:rPr lang="en-GB" sz="1400" dirty="0" smtClean="0"/>
+              <a:t>Best practice is to use both SPF (Sender Policy Framework) and DKIM (Domain Keys Identified Mail) are recommended</a:t>
+            </a:r>
+          </a:p>
+          <a:p>
+            <a:pPr marL="0" indent="0">
+              <a:buNone/>
+            </a:pPr>
+            <a:endParaRPr lang="en-GB" sz="1400" dirty="0"/>
           </a:p>
         </p:txBody>
       </p:sp>
     </p:spTree>
     <p:extLst>
       <p:ext uri="{BB962C8B-B14F-4D97-AF65-F5344CB8AC3E}">
-        <p14:creationId xmlns:p14="http://schemas.microsoft.com/office/powerpoint/2010/main" val="3089397168"/>
+        <p14:creationId xmlns:p14="http://schemas.microsoft.com/office/powerpoint/2010/main" val="4177413645"/>
+      </p:ext>
+    </p:extLst>
+  </p:cSld>
+  <p:clrMapOvr>
+    <a:masterClrMapping/>
+  </p:clrMapOvr>
+  <p:timing>
+    <p:tnLst>
+      <p:par>
+        <p:cTn id="1" dur="indefinite" restart="never" nodeType="tmRoot"/>
+      </p:par>
+    </p:tnLst>
+  </p:timing>
+</p:sld>
+</file>
+
+<file path=ppt/slides/slide31.xml><?xml version="1.0" encoding="utf-8"?>
+<p:sld xmlns:a="http://schemas.openxmlformats.org/drawingml/2006/main" xmlns:r="http://schemas.openxmlformats.org/officeDocument/2006/relationships" xmlns:p="http://schemas.openxmlformats.org/presentationml/2006/main">
+  <p:cSld>
+    <p:spTree>
+      <p:nvGrpSpPr>
+        <p:cNvPr id="1" name=""/>
+        <p:cNvGrpSpPr/>
+        <p:nvPr/>
+      </p:nvGrpSpPr>
+      <p:grpSpPr>
+        <a:xfrm>
+          <a:off x="0" y="0"/>
+          <a:ext cx="0" cy="0"/>
+          <a:chOff x="0" y="0"/>
+          <a:chExt cx="0" cy="0"/>
+        </a:xfrm>
+      </p:grpSpPr>
+      <p:sp>
+        <p:nvSpPr>
+          <p:cNvPr id="2" name="Title 1"/>
+          <p:cNvSpPr>
+            <a:spLocks noGrp="1"/>
+          </p:cNvSpPr>
+          <p:nvPr>
+            <p:ph type="title"/>
+          </p:nvPr>
+        </p:nvSpPr>
+        <p:spPr/>
+        <p:txBody>
+          <a:bodyPr/>
+          <a:lstStyle/>
+          <a:p>
+            <a:r>
+              <a:rPr lang="en-US" dirty="0" smtClean="0"/>
+              <a:t>Lambda</a:t>
+            </a:r>
+            <a:endParaRPr lang="en-US" dirty="0"/>
+          </a:p>
+        </p:txBody>
+      </p:sp>
+      <p:sp>
+        <p:nvSpPr>
+          <p:cNvPr id="3" name="Content Placeholder 2"/>
+          <p:cNvSpPr>
+            <a:spLocks noGrp="1"/>
+          </p:cNvSpPr>
+          <p:nvPr>
+            <p:ph idx="1"/>
+          </p:nvPr>
+        </p:nvSpPr>
+        <p:spPr/>
+        <p:txBody>
+          <a:bodyPr>
+            <a:normAutofit/>
+          </a:bodyPr>
+          <a:lstStyle/>
+          <a:p>
+            <a:r>
+              <a:rPr lang="en-GB" sz="1400" dirty="0" smtClean="0"/>
+              <a:t>Multiple versions of Lambda – Create Alias entry and point to desired version. Event source needs to use Alias ARN to access the function</a:t>
+            </a:r>
+          </a:p>
+          <a:p>
+            <a:pPr marL="0" indent="0">
+              <a:buNone/>
+            </a:pPr>
+            <a:endParaRPr lang="en-GB" sz="1400" dirty="0"/>
+          </a:p>
+        </p:txBody>
+      </p:sp>
+    </p:spTree>
+    <p:extLst>
+      <p:ext uri="{BB962C8B-B14F-4D97-AF65-F5344CB8AC3E}">
+        <p14:creationId xmlns:p14="http://schemas.microsoft.com/office/powerpoint/2010/main" val="3386626381"/>
+      </p:ext>
+    </p:extLst>
+  </p:cSld>
+  <p:clrMapOvr>
+    <a:masterClrMapping/>
+  </p:clrMapOvr>
+  <p:timing>
+    <p:tnLst>
+      <p:par>
+        <p:cTn id="1" dur="indefinite" restart="never" nodeType="tmRoot"/>
+      </p:par>
+    </p:tnLst>
+  </p:timing>
+</p:sld>
+</file>
+
+<file path=ppt/slides/slide32.xml><?xml version="1.0" encoding="utf-8"?>
+<p:sld xmlns:a="http://schemas.openxmlformats.org/drawingml/2006/main" xmlns:r="http://schemas.openxmlformats.org/officeDocument/2006/relationships" xmlns:p="http://schemas.openxmlformats.org/presentationml/2006/main">
+  <p:cSld>
+    <p:spTree>
+      <p:nvGrpSpPr>
+        <p:cNvPr id="1" name=""/>
+        <p:cNvGrpSpPr/>
+        <p:nvPr/>
+      </p:nvGrpSpPr>
+      <p:grpSpPr>
+        <a:xfrm>
+          <a:off x="0" y="0"/>
+          <a:ext cx="0" cy="0"/>
+          <a:chOff x="0" y="0"/>
+          <a:chExt cx="0" cy="0"/>
+        </a:xfrm>
+      </p:grpSpPr>
+      <p:sp>
+        <p:nvSpPr>
+          <p:cNvPr id="2" name="Title 1"/>
+          <p:cNvSpPr>
+            <a:spLocks noGrp="1"/>
+          </p:cNvSpPr>
+          <p:nvPr>
+            <p:ph type="title"/>
+          </p:nvPr>
+        </p:nvSpPr>
+        <p:spPr/>
+        <p:txBody>
+          <a:bodyPr/>
+          <a:lstStyle/>
+          <a:p>
+            <a:r>
+              <a:rPr lang="en-US" dirty="0" smtClean="0"/>
+              <a:t>Redshift</a:t>
+            </a:r>
+            <a:endParaRPr lang="en-US" dirty="0"/>
+          </a:p>
+        </p:txBody>
+      </p:sp>
+      <p:sp>
+        <p:nvSpPr>
+          <p:cNvPr id="3" name="Content Placeholder 2"/>
+          <p:cNvSpPr>
+            <a:spLocks noGrp="1"/>
+          </p:cNvSpPr>
+          <p:nvPr>
+            <p:ph idx="1"/>
+          </p:nvPr>
+        </p:nvSpPr>
+        <p:spPr/>
+        <p:txBody>
+          <a:bodyPr>
+            <a:normAutofit/>
+          </a:bodyPr>
+          <a:lstStyle/>
+          <a:p>
+            <a:r>
+              <a:rPr lang="en-GB" sz="1400" dirty="0"/>
+              <a:t>Redshift is optimized for batched write operations and reading high volumes of data to minimize I/O and maximize data throughput</a:t>
+            </a:r>
+            <a:endParaRPr lang="en-GB" sz="1400" dirty="0"/>
+          </a:p>
+        </p:txBody>
+      </p:sp>
+    </p:spTree>
+    <p:extLst>
+      <p:ext uri="{BB962C8B-B14F-4D97-AF65-F5344CB8AC3E}">
+        <p14:creationId xmlns:p14="http://schemas.microsoft.com/office/powerpoint/2010/main" val="1652036247"/>
+      </p:ext>
+    </p:extLst>
+  </p:cSld>
+  <p:clrMapOvr>
+    <a:masterClrMapping/>
+  </p:clrMapOvr>
+  <p:timing>
+    <p:tnLst>
+      <p:par>
+        <p:cTn id="1" dur="indefinite" restart="never" nodeType="tmRoot"/>
+      </p:par>
+    </p:tnLst>
+  </p:timing>
+</p:sld>
+</file>
+
+<file path=ppt/slides/slide33.xml><?xml version="1.0" encoding="utf-8"?>
+<p:sld xmlns:a="http://schemas.openxmlformats.org/drawingml/2006/main" xmlns:r="http://schemas.openxmlformats.org/officeDocument/2006/relationships" xmlns:p="http://schemas.openxmlformats.org/presentationml/2006/main">
+  <p:cSld>
+    <p:spTree>
+      <p:nvGrpSpPr>
+        <p:cNvPr id="1" name=""/>
+        <p:cNvGrpSpPr/>
+        <p:nvPr/>
+      </p:nvGrpSpPr>
+      <p:grpSpPr>
+        <a:xfrm>
+          <a:off x="0" y="0"/>
+          <a:ext cx="0" cy="0"/>
+          <a:chOff x="0" y="0"/>
+          <a:chExt cx="0" cy="0"/>
+        </a:xfrm>
+      </p:grpSpPr>
+      <p:sp>
+        <p:nvSpPr>
+          <p:cNvPr id="2" name="Title 1"/>
+          <p:cNvSpPr>
+            <a:spLocks noGrp="1"/>
+          </p:cNvSpPr>
+          <p:nvPr>
+            <p:ph type="title"/>
+          </p:nvPr>
+        </p:nvSpPr>
+        <p:spPr/>
+        <p:txBody>
+          <a:bodyPr/>
+          <a:lstStyle/>
+          <a:p>
+            <a:r>
+              <a:rPr lang="en-US" dirty="0" smtClean="0"/>
+              <a:t>References</a:t>
+            </a:r>
+            <a:endParaRPr lang="en-US" dirty="0"/>
+          </a:p>
+        </p:txBody>
+      </p:sp>
+      <p:sp>
+        <p:nvSpPr>
+          <p:cNvPr id="3" name="Content Placeholder 2"/>
+          <p:cNvSpPr>
+            <a:spLocks noGrp="1"/>
+          </p:cNvSpPr>
+          <p:nvPr>
+            <p:ph idx="1"/>
+          </p:nvPr>
+        </p:nvSpPr>
+        <p:spPr/>
+        <p:txBody>
+          <a:bodyPr>
+            <a:normAutofit/>
+          </a:bodyPr>
+          <a:lstStyle/>
+          <a:p>
+            <a:pPr marL="0" indent="0">
+              <a:buNone/>
+            </a:pPr>
+            <a:endParaRPr lang="en-US" sz="1600" dirty="0" smtClean="0"/>
+          </a:p>
+        </p:txBody>
+      </p:sp>
+    </p:spTree>
+    <p:extLst>
+      <p:ext uri="{BB962C8B-B14F-4D97-AF65-F5344CB8AC3E}">
+        <p14:creationId xmlns:p14="http://schemas.microsoft.com/office/powerpoint/2010/main" val="924403351"/>
       </p:ext>
     </p:extLst>
   </p:cSld>
@@ -5290,99 +7454,72 @@
           <a:p>
             <a:r>
               <a:rPr lang="en-US" dirty="0" smtClean="0"/>
-              <a:t>CloudWatch</a:t>
+              <a:t>VPC Components</a:t>
             </a:r>
             <a:endParaRPr lang="en-US" dirty="0"/>
           </a:p>
         </p:txBody>
       </p:sp>
-      <p:sp>
-        <p:nvSpPr>
-          <p:cNvPr id="3" name="Content Placeholder 2"/>
-          <p:cNvSpPr>
-            <a:spLocks noGrp="1"/>
-          </p:cNvSpPr>
+      <p:pic>
+        <p:nvPicPr>
+          <p:cNvPr id="4" name="Picture 2"/>
+          <p:cNvPicPr>
+            <a:picLocks noGrp="1" noChangeAspect="1" noChangeArrowheads="1"/>
+          </p:cNvPicPr>
           <p:nvPr>
             <p:ph idx="1"/>
           </p:nvPr>
-        </p:nvSpPr>
-        <p:spPr/>
-        <p:txBody>
-          <a:bodyPr>
-            <a:normAutofit/>
-          </a:bodyPr>
-          <a:lstStyle/>
-          <a:p>
-            <a:r>
-              <a:rPr lang="en-GB" sz="1400" dirty="0"/>
-              <a:t>You can create a CloudWatch alarm that watches a single metric. The alarm performs one or more actions based on the value of the metric relative to a threshold over a number of time periods. The action can be an Amazon EC2 action, an Auto Scaling action, or a notification sent to an Amazon SNS topic.</a:t>
-            </a:r>
-          </a:p>
-          <a:p>
-            <a:pPr marL="0" indent="0">
-              <a:buNone/>
-            </a:pPr>
-            <a:r>
-              <a:rPr lang="en-GB" sz="1400" dirty="0"/>
-              <a:t> </a:t>
-            </a:r>
-            <a:r>
-              <a:rPr lang="en-GB" sz="1400" dirty="0" smtClean="0"/>
-              <a:t>   An </a:t>
-            </a:r>
-            <a:r>
-              <a:rPr lang="en-GB" sz="1400" dirty="0"/>
-              <a:t>alarm has three possible states:</a:t>
-            </a:r>
-          </a:p>
-          <a:p>
-            <a:pPr>
-              <a:buFont typeface="Wingdings" panose="05000000000000000000" pitchFamily="2" charset="2"/>
-              <a:buChar char="Ø"/>
-            </a:pPr>
-            <a:r>
-              <a:rPr lang="en-GB" sz="1400" b="1" i="1" dirty="0"/>
-              <a:t>OK</a:t>
-            </a:r>
-            <a:r>
-              <a:rPr lang="en-GB" sz="1400" dirty="0"/>
-              <a:t>—The metric is within the defined threshold</a:t>
-            </a:r>
-          </a:p>
-          <a:p>
-            <a:pPr>
-              <a:buFont typeface="Wingdings" panose="05000000000000000000" pitchFamily="2" charset="2"/>
-              <a:buChar char="Ø"/>
-            </a:pPr>
-            <a:r>
-              <a:rPr lang="en-GB" sz="1400" b="1" i="1" dirty="0"/>
-              <a:t>ALARM</a:t>
-            </a:r>
-            <a:r>
-              <a:rPr lang="en-GB" sz="1400" dirty="0"/>
-              <a:t>—The metric is outside of the defined threshold</a:t>
-            </a:r>
-          </a:p>
-          <a:p>
-            <a:pPr>
-              <a:buFont typeface="Wingdings" panose="05000000000000000000" pitchFamily="2" charset="2"/>
-              <a:buChar char="Ø"/>
-            </a:pPr>
-            <a:r>
-              <a:rPr lang="en-GB" sz="1400" b="1" i="1" dirty="0"/>
-              <a:t>INSUFFICIENT_DATA</a:t>
-            </a:r>
-            <a:r>
-              <a:rPr lang="en-GB" sz="1400" dirty="0"/>
-              <a:t>—The alarm has just started, the metric is not available, or not enough data is available for the metric to determine the alarm state</a:t>
-            </a:r>
-          </a:p>
-        </p:txBody>
-      </p:sp>
+        </p:nvPicPr>
+        <p:blipFill>
+          <a:blip r:embed="rId2">
+            <a:extLst>
+              <a:ext uri="{28A0092B-C50C-407E-A947-70E740481C1C}">
+                <a14:useLocalDpi xmlns:a14="http://schemas.microsoft.com/office/drawing/2010/main" val="0"/>
+              </a:ext>
+            </a:extLst>
+          </a:blip>
+          <a:srcRect/>
+          <a:stretch>
+            <a:fillRect/>
+          </a:stretch>
+        </p:blipFill>
+        <p:spPr bwMode="auto">
+          <a:xfrm>
+            <a:off x="467544" y="1772816"/>
+            <a:ext cx="8229600" cy="3721813"/>
+          </a:xfrm>
+          <a:prstGeom prst="rect">
+            <a:avLst/>
+          </a:prstGeom>
+          <a:noFill/>
+          <a:ln>
+            <a:noFill/>
+          </a:ln>
+          <a:extLst>
+            <a:ext uri="{909E8E84-426E-40DD-AFC4-6F175D3DCCD1}">
+              <a14:hiddenFill xmlns:a14="http://schemas.microsoft.com/office/drawing/2010/main">
+                <a:solidFill>
+                  <a:schemeClr val="accent1"/>
+                </a:solidFill>
+              </a14:hiddenFill>
+            </a:ext>
+            <a:ext uri="{91240B29-F687-4F45-9708-019B960494DF}">
+              <a14:hiddenLine xmlns:a14="http://schemas.microsoft.com/office/drawing/2010/main" w="9525">
+                <a:solidFill>
+                  <a:schemeClr val="tx1"/>
+                </a:solidFill>
+                <a:miter lim="800000"/>
+                <a:headEnd/>
+                <a:tailEnd/>
+              </a14:hiddenLine>
+            </a:ext>
+          </a:extLst>
+        </p:spPr>
+      </p:pic>
     </p:spTree>
     <p:extLst>
       <p:ext uri="{BB962C8B-B14F-4D97-AF65-F5344CB8AC3E}">
-        <p14:creationId xmlns:p14="http://schemas.microsoft.com/office/powerpoint/2010/main" val="3816719496"/>
+        <p14:creationId xmlns:p14="http://schemas.microsoft.com/office/powerpoint/2010/main" val="951293177"/>
       </p:ext>
     </p:extLst>
   </p:cSld>
@@ -5433,7 +7570,7 @@
           <a:p>
             <a:r>
               <a:rPr lang="en-US" dirty="0" smtClean="0"/>
-              <a:t>CloudWatch</a:t>
+              <a:t>Placement Group</a:t>
             </a:r>
             <a:endParaRPr lang="en-US" dirty="0"/>
           </a:p>
@@ -5457,82 +7594,32 @@
           <a:lstStyle/>
           <a:p>
             <a:r>
-              <a:rPr lang="en-GB" sz="1400" b="1" dirty="0" smtClean="0"/>
-              <a:t>Two types of namespaces</a:t>
-            </a:r>
-          </a:p>
-          <a:p>
-            <a:pPr lvl="1">
-              <a:buFont typeface="Wingdings" panose="05000000000000000000" pitchFamily="2" charset="2"/>
-              <a:buChar char="Ø"/>
-            </a:pPr>
-            <a:r>
-              <a:rPr lang="en-GB" sz="1400" dirty="0" smtClean="0"/>
-              <a:t>Custom Namespace</a:t>
-            </a:r>
-          </a:p>
-          <a:p>
-            <a:pPr lvl="1">
-              <a:buFont typeface="Wingdings" panose="05000000000000000000" pitchFamily="2" charset="2"/>
-              <a:buChar char="Ø"/>
-            </a:pPr>
-            <a:r>
-              <a:rPr lang="en-GB" sz="1400" dirty="0" smtClean="0"/>
-              <a:t>AWS Namespace</a:t>
-            </a:r>
-          </a:p>
-          <a:p>
-            <a:pPr marL="274320" lvl="1" indent="0">
-              <a:buNone/>
-            </a:pPr>
-            <a:endParaRPr lang="en-GB" sz="1400" dirty="0"/>
-          </a:p>
-          <a:p>
-            <a:r>
-              <a:rPr lang="en-GB" sz="1400" b="1" dirty="0" smtClean="0"/>
-              <a:t>Types of monitoring</a:t>
-            </a:r>
-          </a:p>
-          <a:p>
-            <a:pPr lvl="1">
-              <a:buFont typeface="Wingdings" panose="05000000000000000000" pitchFamily="2" charset="2"/>
-              <a:buChar char="Ø"/>
-            </a:pPr>
-            <a:r>
-              <a:rPr lang="en-GB" sz="1400" dirty="0" smtClean="0"/>
-              <a:t>Basic Monitoring		every 5 Minutes</a:t>
-            </a:r>
-            <a:endParaRPr lang="en-GB" sz="1400" dirty="0"/>
-          </a:p>
-          <a:p>
-            <a:pPr lvl="1">
-              <a:buFont typeface="Wingdings" panose="05000000000000000000" pitchFamily="2" charset="2"/>
-              <a:buChar char="Ø"/>
-            </a:pPr>
-            <a:r>
-              <a:rPr lang="en-GB" sz="1400" dirty="0" smtClean="0"/>
-              <a:t>Detailed Monitoring	every 1 minute</a:t>
-            </a:r>
-            <a:endParaRPr lang="en-GB" sz="1400" dirty="0"/>
-          </a:p>
-          <a:p>
-            <a:endParaRPr lang="en-GB" sz="1400" dirty="0" smtClean="0"/>
-          </a:p>
-          <a:p>
-            <a:endParaRPr lang="en-GB" sz="1400" dirty="0"/>
-          </a:p>
-          <a:p>
-            <a:pPr marL="274320" lvl="1" indent="0">
-              <a:buNone/>
-            </a:pPr>
-            <a:endParaRPr lang="en-GB" sz="1400" dirty="0"/>
+              <a:rPr lang="en-GB" sz="1400" dirty="0"/>
+              <a:t>A </a:t>
+            </a:r>
+            <a:r>
+              <a:rPr lang="en-GB" sz="1400" b="1" i="1" dirty="0"/>
+              <a:t>placement group</a:t>
+            </a:r>
+            <a:r>
+              <a:rPr lang="en-GB" sz="1400" dirty="0"/>
+              <a:t> is a logical grouping of instances within a single Availability Zone. Placement groups are recommended for applications that benefit </a:t>
+            </a:r>
+            <a:r>
+              <a:rPr lang="en-GB" sz="1400" b="1" dirty="0"/>
+              <a:t>from low network latency, high network throughput, or both</a:t>
+            </a:r>
+            <a:r>
+              <a:rPr lang="en-GB" sz="1400" dirty="0"/>
+              <a:t>. To provide the lowest latency, and the highest packet-per-second network performance for your placement group, choose an instance type that supports enhanced networking.</a:t>
+            </a:r>
           </a:p>
         </p:txBody>
       </p:sp>
     </p:spTree>
     <p:extLst>
       <p:ext uri="{BB962C8B-B14F-4D97-AF65-F5344CB8AC3E}">
-        <p14:creationId xmlns:p14="http://schemas.microsoft.com/office/powerpoint/2010/main" val="2556729331"/>
+        <p14:creationId xmlns:p14="http://schemas.microsoft.com/office/powerpoint/2010/main" val="3089397168"/>
       </p:ext>
     </p:extLst>
   </p:cSld>
@@ -5583,6 +7670,396 @@
           <a:p>
             <a:r>
               <a:rPr lang="en-US" dirty="0" smtClean="0"/>
+              <a:t>CloudWatch</a:t>
+            </a:r>
+            <a:endParaRPr lang="en-US" dirty="0"/>
+          </a:p>
+        </p:txBody>
+      </p:sp>
+      <p:sp>
+        <p:nvSpPr>
+          <p:cNvPr id="3" name="Content Placeholder 2"/>
+          <p:cNvSpPr>
+            <a:spLocks noGrp="1"/>
+          </p:cNvSpPr>
+          <p:nvPr>
+            <p:ph idx="1"/>
+          </p:nvPr>
+        </p:nvSpPr>
+        <p:spPr/>
+        <p:txBody>
+          <a:bodyPr>
+            <a:normAutofit/>
+          </a:bodyPr>
+          <a:lstStyle/>
+          <a:p>
+            <a:r>
+              <a:rPr lang="en-GB" sz="1400" dirty="0"/>
+              <a:t>You can create a CloudWatch alarm that watches a single metric. The alarm performs one or more actions based on the value of the metric relative to a threshold over a number of time periods. The action can be an Amazon EC2 action, an Auto Scaling action, or a notification sent to an Amazon SNS topic.</a:t>
+            </a:r>
+          </a:p>
+          <a:p>
+            <a:pPr marL="0" indent="0">
+              <a:buNone/>
+            </a:pPr>
+            <a:r>
+              <a:rPr lang="en-GB" sz="1400" dirty="0"/>
+              <a:t> </a:t>
+            </a:r>
+            <a:r>
+              <a:rPr lang="en-GB" sz="1400" dirty="0" smtClean="0"/>
+              <a:t>   An </a:t>
+            </a:r>
+            <a:r>
+              <a:rPr lang="en-GB" sz="1400" dirty="0"/>
+              <a:t>alarm has three possible states:</a:t>
+            </a:r>
+          </a:p>
+          <a:p>
+            <a:pPr>
+              <a:buFont typeface="Wingdings" panose="05000000000000000000" pitchFamily="2" charset="2"/>
+              <a:buChar char="Ø"/>
+            </a:pPr>
+            <a:r>
+              <a:rPr lang="en-GB" sz="1400" b="1" i="1" dirty="0"/>
+              <a:t>OK</a:t>
+            </a:r>
+            <a:r>
+              <a:rPr lang="en-GB" sz="1400" dirty="0"/>
+              <a:t>—The metric is within the defined threshold</a:t>
+            </a:r>
+          </a:p>
+          <a:p>
+            <a:pPr>
+              <a:buFont typeface="Wingdings" panose="05000000000000000000" pitchFamily="2" charset="2"/>
+              <a:buChar char="Ø"/>
+            </a:pPr>
+            <a:r>
+              <a:rPr lang="en-GB" sz="1400" b="1" i="1" dirty="0"/>
+              <a:t>ALARM</a:t>
+            </a:r>
+            <a:r>
+              <a:rPr lang="en-GB" sz="1400" dirty="0"/>
+              <a:t>—The metric is outside of the defined threshold</a:t>
+            </a:r>
+          </a:p>
+          <a:p>
+            <a:pPr>
+              <a:buFont typeface="Wingdings" panose="05000000000000000000" pitchFamily="2" charset="2"/>
+              <a:buChar char="Ø"/>
+            </a:pPr>
+            <a:r>
+              <a:rPr lang="en-GB" sz="1400" b="1" i="1" dirty="0"/>
+              <a:t>INSUFFICIENT_DATA</a:t>
+            </a:r>
+            <a:r>
+              <a:rPr lang="en-GB" sz="1400" dirty="0"/>
+              <a:t>—The alarm has just started, the metric is not available, or not enough data is available for the metric to determine the alarm state</a:t>
+            </a:r>
+          </a:p>
+        </p:txBody>
+      </p:sp>
+    </p:spTree>
+    <p:extLst>
+      <p:ext uri="{BB962C8B-B14F-4D97-AF65-F5344CB8AC3E}">
+        <p14:creationId xmlns:p14="http://schemas.microsoft.com/office/powerpoint/2010/main" val="3816719496"/>
+      </p:ext>
+    </p:extLst>
+  </p:cSld>
+  <p:clrMapOvr>
+    <a:masterClrMapping/>
+  </p:clrMapOvr>
+  <p:timing>
+    <p:tnLst>
+      <p:par>
+        <p:cTn id="1" dur="indefinite" restart="never" nodeType="tmRoot"/>
+      </p:par>
+    </p:tnLst>
+  </p:timing>
+</p:sld>
+</file>
+
+<file path=ppt/slides/slide7.xml><?xml version="1.0" encoding="utf-8"?>
+<p:sld xmlns:a="http://schemas.openxmlformats.org/drawingml/2006/main" xmlns:r="http://schemas.openxmlformats.org/officeDocument/2006/relationships" xmlns:p="http://schemas.openxmlformats.org/presentationml/2006/main">
+  <p:cSld>
+    <p:spTree>
+      <p:nvGrpSpPr>
+        <p:cNvPr id="1" name=""/>
+        <p:cNvGrpSpPr/>
+        <p:nvPr/>
+      </p:nvGrpSpPr>
+      <p:grpSpPr>
+        <a:xfrm>
+          <a:off x="0" y="0"/>
+          <a:ext cx="0" cy="0"/>
+          <a:chOff x="0" y="0"/>
+          <a:chExt cx="0" cy="0"/>
+        </a:xfrm>
+      </p:grpSpPr>
+      <p:sp>
+        <p:nvSpPr>
+          <p:cNvPr id="2" name="Title 1"/>
+          <p:cNvSpPr>
+            <a:spLocks noGrp="1"/>
+          </p:cNvSpPr>
+          <p:nvPr>
+            <p:ph type="title"/>
+          </p:nvPr>
+        </p:nvSpPr>
+        <p:spPr/>
+        <p:txBody>
+          <a:bodyPr/>
+          <a:lstStyle/>
+          <a:p>
+            <a:r>
+              <a:rPr lang="en-US" dirty="0" smtClean="0"/>
+              <a:t>CloudWatch</a:t>
+            </a:r>
+            <a:endParaRPr lang="en-US" dirty="0"/>
+          </a:p>
+        </p:txBody>
+      </p:sp>
+      <p:sp>
+        <p:nvSpPr>
+          <p:cNvPr id="3" name="Content Placeholder 2"/>
+          <p:cNvSpPr>
+            <a:spLocks noGrp="1"/>
+          </p:cNvSpPr>
+          <p:nvPr>
+            <p:ph idx="1"/>
+          </p:nvPr>
+        </p:nvSpPr>
+        <p:spPr/>
+        <p:txBody>
+          <a:bodyPr>
+            <a:normAutofit/>
+          </a:bodyPr>
+          <a:lstStyle/>
+          <a:p>
+            <a:r>
+              <a:rPr lang="en-GB" sz="1400" b="1" dirty="0" smtClean="0"/>
+              <a:t>Two types of namespaces</a:t>
+            </a:r>
+          </a:p>
+          <a:p>
+            <a:pPr lvl="1">
+              <a:buFont typeface="Wingdings" panose="05000000000000000000" pitchFamily="2" charset="2"/>
+              <a:buChar char="Ø"/>
+            </a:pPr>
+            <a:r>
+              <a:rPr lang="en-GB" sz="1400" dirty="0" smtClean="0"/>
+              <a:t>Custom Namespace</a:t>
+            </a:r>
+          </a:p>
+          <a:p>
+            <a:pPr lvl="1">
+              <a:buFont typeface="Wingdings" panose="05000000000000000000" pitchFamily="2" charset="2"/>
+              <a:buChar char="Ø"/>
+            </a:pPr>
+            <a:r>
+              <a:rPr lang="en-GB" sz="1400" dirty="0" smtClean="0"/>
+              <a:t>AWS Namespace</a:t>
+            </a:r>
+          </a:p>
+          <a:p>
+            <a:pPr marL="274320" lvl="1" indent="0">
+              <a:buNone/>
+            </a:pPr>
+            <a:endParaRPr lang="en-GB" sz="1400" dirty="0"/>
+          </a:p>
+          <a:p>
+            <a:r>
+              <a:rPr lang="en-GB" sz="1400" b="1" dirty="0" smtClean="0"/>
+              <a:t>Types of monitoring</a:t>
+            </a:r>
+          </a:p>
+          <a:p>
+            <a:pPr lvl="1">
+              <a:buFont typeface="Wingdings" panose="05000000000000000000" pitchFamily="2" charset="2"/>
+              <a:buChar char="Ø"/>
+            </a:pPr>
+            <a:r>
+              <a:rPr lang="en-GB" sz="1400" dirty="0" smtClean="0"/>
+              <a:t>Basic Monitoring		every 5 Minutes</a:t>
+            </a:r>
+            <a:endParaRPr lang="en-GB" sz="1400" dirty="0"/>
+          </a:p>
+          <a:p>
+            <a:pPr lvl="1">
+              <a:buFont typeface="Wingdings" panose="05000000000000000000" pitchFamily="2" charset="2"/>
+              <a:buChar char="Ø"/>
+            </a:pPr>
+            <a:r>
+              <a:rPr lang="en-GB" sz="1400" dirty="0" smtClean="0"/>
+              <a:t>Detailed Monitoring	every 1 minute</a:t>
+            </a:r>
+          </a:p>
+          <a:p>
+            <a:pPr lvl="1">
+              <a:buFont typeface="Wingdings" panose="05000000000000000000" pitchFamily="2" charset="2"/>
+              <a:buChar char="Ø"/>
+            </a:pPr>
+            <a:endParaRPr lang="en-GB" sz="1400" dirty="0"/>
+          </a:p>
+          <a:p>
+            <a:r>
+              <a:rPr lang="en-GB" sz="1400" b="1" dirty="0" smtClean="0"/>
+              <a:t>CloudWatch logs can monitor:-</a:t>
+            </a:r>
+          </a:p>
+          <a:p>
+            <a:pPr lvl="1"/>
+            <a:r>
+              <a:rPr lang="en-GB" sz="1400" dirty="0" smtClean="0"/>
+              <a:t>Application generated log files</a:t>
+            </a:r>
+          </a:p>
+          <a:p>
+            <a:pPr lvl="1"/>
+            <a:r>
+              <a:rPr lang="en-GB" sz="1400" dirty="0" smtClean="0"/>
+              <a:t>OS generated log files</a:t>
+            </a:r>
+          </a:p>
+          <a:p>
+            <a:pPr lvl="1"/>
+            <a:r>
+              <a:rPr lang="en-GB" sz="1400" dirty="0" smtClean="0"/>
+              <a:t>Any other messages of interest</a:t>
+            </a:r>
+          </a:p>
+          <a:p>
+            <a:pPr lvl="1"/>
+            <a:endParaRPr lang="en-GB" sz="1400" dirty="0"/>
+          </a:p>
+          <a:p>
+            <a:r>
+              <a:rPr lang="en-GB" sz="1400" b="1" dirty="0"/>
+              <a:t>When you </a:t>
+            </a:r>
+            <a:r>
+              <a:rPr lang="en-GB" sz="1400" b="1" dirty="0">
+                <a:solidFill>
+                  <a:srgbClr val="FF0000"/>
+                </a:solidFill>
+              </a:rPr>
+              <a:t>recover</a:t>
+            </a:r>
+            <a:r>
+              <a:rPr lang="en-GB" sz="1400" b="1" dirty="0"/>
+              <a:t> an EC2 instance using CloudWatch Alarm, what happens to the </a:t>
+            </a:r>
+            <a:r>
+              <a:rPr lang="en-GB" sz="1400" b="1" dirty="0" smtClean="0"/>
+              <a:t>instance? </a:t>
+            </a:r>
+            <a:r>
+              <a:rPr lang="en-GB" sz="1400" dirty="0" smtClean="0"/>
+              <a:t>Instance is moved to a different physical host. Instance has </a:t>
+            </a:r>
+            <a:r>
+              <a:rPr lang="en-GB" sz="1400" b="1" dirty="0" smtClean="0">
+                <a:solidFill>
+                  <a:srgbClr val="00B050"/>
+                </a:solidFill>
+              </a:rPr>
+              <a:t>same metadata including public IP </a:t>
+            </a:r>
+            <a:r>
+              <a:rPr lang="en-GB" sz="1400" b="1" dirty="0" smtClean="0">
+                <a:solidFill>
+                  <a:srgbClr val="00B050"/>
+                </a:solidFill>
+              </a:rPr>
+              <a:t>address</a:t>
+            </a:r>
+          </a:p>
+          <a:p>
+            <a:r>
+              <a:rPr lang="en-GB" sz="1400" dirty="0"/>
+              <a:t>Alarm is associated with one metric</a:t>
+            </a:r>
+            <a:endParaRPr lang="en-GB" sz="1400" b="1" dirty="0">
+              <a:solidFill>
+                <a:srgbClr val="00B050"/>
+              </a:solidFill>
+            </a:endParaRPr>
+          </a:p>
+          <a:p>
+            <a:pPr lvl="1">
+              <a:buFont typeface="Wingdings" panose="05000000000000000000" pitchFamily="2" charset="2"/>
+              <a:buChar char="Ø"/>
+            </a:pPr>
+            <a:endParaRPr lang="en-GB" sz="1400" dirty="0"/>
+          </a:p>
+          <a:p>
+            <a:endParaRPr lang="en-GB" sz="1400" dirty="0" smtClean="0"/>
+          </a:p>
+          <a:p>
+            <a:endParaRPr lang="en-GB" sz="1400" dirty="0"/>
+          </a:p>
+          <a:p>
+            <a:pPr marL="274320" lvl="1" indent="0">
+              <a:buNone/>
+            </a:pPr>
+            <a:endParaRPr lang="en-GB" sz="1400" dirty="0"/>
+          </a:p>
+        </p:txBody>
+      </p:sp>
+    </p:spTree>
+    <p:extLst>
+      <p:ext uri="{BB962C8B-B14F-4D97-AF65-F5344CB8AC3E}">
+        <p14:creationId xmlns:p14="http://schemas.microsoft.com/office/powerpoint/2010/main" val="2556729331"/>
+      </p:ext>
+    </p:extLst>
+  </p:cSld>
+  <p:clrMapOvr>
+    <a:masterClrMapping/>
+  </p:clrMapOvr>
+  <p:timing>
+    <p:tnLst>
+      <p:par>
+        <p:cTn id="1" dur="indefinite" restart="never" nodeType="tmRoot"/>
+      </p:par>
+    </p:tnLst>
+  </p:timing>
+</p:sld>
+</file>
+
+<file path=ppt/slides/slide8.xml><?xml version="1.0" encoding="utf-8"?>
+<p:sld xmlns:a="http://schemas.openxmlformats.org/drawingml/2006/main" xmlns:r="http://schemas.openxmlformats.org/officeDocument/2006/relationships" xmlns:p="http://schemas.openxmlformats.org/presentationml/2006/main">
+  <p:cSld>
+    <p:spTree>
+      <p:nvGrpSpPr>
+        <p:cNvPr id="1" name=""/>
+        <p:cNvGrpSpPr/>
+        <p:nvPr/>
+      </p:nvGrpSpPr>
+      <p:grpSpPr>
+        <a:xfrm>
+          <a:off x="0" y="0"/>
+          <a:ext cx="0" cy="0"/>
+          <a:chOff x="0" y="0"/>
+          <a:chExt cx="0" cy="0"/>
+        </a:xfrm>
+      </p:grpSpPr>
+      <p:sp>
+        <p:nvSpPr>
+          <p:cNvPr id="2" name="Title 1"/>
+          <p:cNvSpPr>
+            <a:spLocks noGrp="1"/>
+          </p:cNvSpPr>
+          <p:nvPr>
+            <p:ph type="title"/>
+          </p:nvPr>
+        </p:nvSpPr>
+        <p:spPr/>
+        <p:txBody>
+          <a:bodyPr/>
+          <a:lstStyle/>
+          <a:p>
+            <a:r>
+              <a:rPr lang="en-US" dirty="0" smtClean="0"/>
               <a:t>CloudWatch Metrics</a:t>
             </a:r>
             <a:endParaRPr lang="en-US" dirty="0"/>
@@ -5727,7 +8204,7 @@
 </p:sld>
 </file>
 
-<file path=ppt/slides/slide7.xml><?xml version="1.0" encoding="utf-8"?>
+<file path=ppt/slides/slide9.xml><?xml version="1.0" encoding="utf-8"?>
 <p:sld xmlns:a="http://schemas.openxmlformats.org/drawingml/2006/main" xmlns:r="http://schemas.openxmlformats.org/officeDocument/2006/relationships" xmlns:p="http://schemas.openxmlformats.org/presentationml/2006/main">
   <p:cSld>
     <p:spTree>
@@ -6503,248 +8980,6 @@
 </p:sld>
 </file>
 
-<file path=ppt/slides/slide8.xml><?xml version="1.0" encoding="utf-8"?>
-<p:sld xmlns:a="http://schemas.openxmlformats.org/drawingml/2006/main" xmlns:r="http://schemas.openxmlformats.org/officeDocument/2006/relationships" xmlns:p="http://schemas.openxmlformats.org/presentationml/2006/main">
-  <p:cSld>
-    <p:spTree>
-      <p:nvGrpSpPr>
-        <p:cNvPr id="1" name=""/>
-        <p:cNvGrpSpPr/>
-        <p:nvPr/>
-      </p:nvGrpSpPr>
-      <p:grpSpPr>
-        <a:xfrm>
-          <a:off x="0" y="0"/>
-          <a:ext cx="0" cy="0"/>
-          <a:chOff x="0" y="0"/>
-          <a:chExt cx="0" cy="0"/>
-        </a:xfrm>
-      </p:grpSpPr>
-      <p:sp>
-        <p:nvSpPr>
-          <p:cNvPr id="2" name="Title 1"/>
-          <p:cNvSpPr>
-            <a:spLocks noGrp="1"/>
-          </p:cNvSpPr>
-          <p:nvPr>
-            <p:ph type="title"/>
-          </p:nvPr>
-        </p:nvSpPr>
-        <p:spPr/>
-        <p:txBody>
-          <a:bodyPr/>
-          <a:lstStyle/>
-          <a:p>
-            <a:r>
-              <a:rPr lang="en-US" dirty="0" smtClean="0"/>
-              <a:t>Auto Scaling</a:t>
-            </a:r>
-            <a:endParaRPr lang="en-US" dirty="0"/>
-          </a:p>
-        </p:txBody>
-      </p:sp>
-      <p:sp>
-        <p:nvSpPr>
-          <p:cNvPr id="3" name="Content Placeholder 2"/>
-          <p:cNvSpPr>
-            <a:spLocks noGrp="1"/>
-          </p:cNvSpPr>
-          <p:nvPr>
-            <p:ph idx="1"/>
-          </p:nvPr>
-        </p:nvSpPr>
-        <p:spPr/>
-        <p:txBody>
-          <a:bodyPr>
-            <a:normAutofit/>
-          </a:bodyPr>
-          <a:lstStyle/>
-          <a:p>
-            <a:r>
-              <a:rPr lang="en-GB" sz="1400" b="1" dirty="0"/>
-              <a:t>Availability Zone Rebalancing </a:t>
-            </a:r>
-            <a:r>
-              <a:rPr lang="en-GB" sz="1400" b="1" dirty="0" smtClean="0"/>
-              <a:t>process (</a:t>
-            </a:r>
-            <a:r>
-              <a:rPr lang="en-GB" sz="1400" b="1" dirty="0" err="1"/>
-              <a:t>AZRebalance</a:t>
-            </a:r>
-            <a:r>
-              <a:rPr lang="en-GB" sz="1400" b="1" dirty="0" smtClean="0"/>
-              <a:t>)</a:t>
-            </a:r>
-            <a:r>
-              <a:rPr lang="en-GB" sz="1400" dirty="0" smtClean="0"/>
-              <a:t> - </a:t>
-            </a:r>
-            <a:r>
-              <a:rPr lang="en-GB" sz="1400" dirty="0"/>
-              <a:t>Auto Scaling performs various processes, such as Launch, Terminate, and Availability Zone Rebalance (</a:t>
-            </a:r>
-            <a:r>
-              <a:rPr lang="en-GB" sz="1400" dirty="0" err="1"/>
-              <a:t>AZRebalance</a:t>
-            </a:r>
-            <a:r>
-              <a:rPr lang="en-GB" sz="1400" dirty="0"/>
-              <a:t>). The </a:t>
-            </a:r>
-            <a:r>
-              <a:rPr lang="en-GB" sz="1400" dirty="0" err="1"/>
-              <a:t>AZRebalance</a:t>
-            </a:r>
-            <a:r>
-              <a:rPr lang="en-GB" sz="1400" dirty="0"/>
-              <a:t> process type seeks to maintain a balanced number of instances across Availability Zones within a region. If the user suspends the Terminate process, the </a:t>
-            </a:r>
-            <a:r>
-              <a:rPr lang="en-GB" sz="1400" dirty="0" err="1"/>
-              <a:t>AZRebalance</a:t>
-            </a:r>
-            <a:r>
-              <a:rPr lang="en-GB" sz="1400" dirty="0"/>
-              <a:t> process can cause the Auto Scaling group to grow up to ten percent larger than the maximum size. This is because Auto Scaling allows groups to temporarily grow larger than the maximum size during rebalancing activities. If Auto Scaling cannot terminate instances, the Auto Scaling group could remain up to ten percent larger than the maximum size until the user resumes the Terminate process type.  </a:t>
-            </a:r>
-            <a:endParaRPr lang="en-GB" sz="1400" dirty="0" smtClean="0"/>
-          </a:p>
-          <a:p>
-            <a:r>
-              <a:rPr lang="en-GB" sz="1400" dirty="0" smtClean="0"/>
-              <a:t>Auto scaling can be terminated temporarily </a:t>
-            </a:r>
-          </a:p>
-          <a:p>
-            <a:r>
-              <a:rPr lang="en-GB" sz="1400" dirty="0"/>
-              <a:t>When rebalancing, Auto Scaling launches new instances before terminating the old ones, so that rebalancing does not compromise the performance or availability of your application. Because Auto Scaling attempts to launch new instances before terminating the old ones, being at or near the specified maximum capacity could impede or completely halt rebalancing activities. To avoid this problem, the system can temporarily exceed the specified maximum capacity of a group by a </a:t>
-            </a:r>
-            <a:r>
-              <a:rPr lang="en-GB" sz="1400" b="1" dirty="0">
-                <a:solidFill>
-                  <a:srgbClr val="00B050"/>
-                </a:solidFill>
-              </a:rPr>
-              <a:t>10 percent margin</a:t>
-            </a:r>
-            <a:r>
-              <a:rPr lang="en-GB" sz="1400" dirty="0"/>
-              <a:t> (or by a 1-instance margin, whichever is greater) during a rebalancing activity.</a:t>
-            </a:r>
-          </a:p>
-        </p:txBody>
-      </p:sp>
-    </p:spTree>
-    <p:extLst>
-      <p:ext uri="{BB962C8B-B14F-4D97-AF65-F5344CB8AC3E}">
-        <p14:creationId xmlns:p14="http://schemas.microsoft.com/office/powerpoint/2010/main" val="562292818"/>
-      </p:ext>
-    </p:extLst>
-  </p:cSld>
-  <p:clrMapOvr>
-    <a:masterClrMapping/>
-  </p:clrMapOvr>
-  <p:timing>
-    <p:tnLst>
-      <p:par>
-        <p:cTn id="1" dur="indefinite" restart="never" nodeType="tmRoot"/>
-      </p:par>
-    </p:tnLst>
-  </p:timing>
-</p:sld>
-</file>
-
-<file path=ppt/slides/slide9.xml><?xml version="1.0" encoding="utf-8"?>
-<p:sld xmlns:a="http://schemas.openxmlformats.org/drawingml/2006/main" xmlns:r="http://schemas.openxmlformats.org/officeDocument/2006/relationships" xmlns:p="http://schemas.openxmlformats.org/presentationml/2006/main">
-  <p:cSld>
-    <p:spTree>
-      <p:nvGrpSpPr>
-        <p:cNvPr id="1" name=""/>
-        <p:cNvGrpSpPr/>
-        <p:nvPr/>
-      </p:nvGrpSpPr>
-      <p:grpSpPr>
-        <a:xfrm>
-          <a:off x="0" y="0"/>
-          <a:ext cx="0" cy="0"/>
-          <a:chOff x="0" y="0"/>
-          <a:chExt cx="0" cy="0"/>
-        </a:xfrm>
-      </p:grpSpPr>
-      <p:sp>
-        <p:nvSpPr>
-          <p:cNvPr id="2" name="Title 1"/>
-          <p:cNvSpPr>
-            <a:spLocks noGrp="1"/>
-          </p:cNvSpPr>
-          <p:nvPr>
-            <p:ph type="title"/>
-          </p:nvPr>
-        </p:nvSpPr>
-        <p:spPr/>
-        <p:txBody>
-          <a:bodyPr/>
-          <a:lstStyle/>
-          <a:p>
-            <a:r>
-              <a:rPr lang="en-US" dirty="0" smtClean="0"/>
-              <a:t>Elastic IP Address</a:t>
-            </a:r>
-            <a:endParaRPr lang="en-US" dirty="0"/>
-          </a:p>
-        </p:txBody>
-      </p:sp>
-      <p:sp>
-        <p:nvSpPr>
-          <p:cNvPr id="3" name="Content Placeholder 2"/>
-          <p:cNvSpPr>
-            <a:spLocks noGrp="1"/>
-          </p:cNvSpPr>
-          <p:nvPr>
-            <p:ph idx="1"/>
-          </p:nvPr>
-        </p:nvSpPr>
-        <p:spPr/>
-        <p:txBody>
-          <a:bodyPr>
-            <a:normAutofit/>
-          </a:bodyPr>
-          <a:lstStyle/>
-          <a:p>
-            <a:r>
-              <a:rPr lang="en-GB" sz="1400" dirty="0"/>
-              <a:t>The number of Elastic IP addresses you can have in EC2 per region is </a:t>
-            </a:r>
-            <a:r>
-              <a:rPr lang="en-GB" sz="1400" b="1" dirty="0" smtClean="0"/>
-              <a:t>5</a:t>
-            </a:r>
-            <a:endParaRPr lang="en-GB" sz="1400" dirty="0"/>
-          </a:p>
-        </p:txBody>
-      </p:sp>
-    </p:spTree>
-    <p:extLst>
-      <p:ext uri="{BB962C8B-B14F-4D97-AF65-F5344CB8AC3E}">
-        <p14:creationId xmlns:p14="http://schemas.microsoft.com/office/powerpoint/2010/main" val="1278525109"/>
-      </p:ext>
-    </p:extLst>
-  </p:cSld>
-  <p:clrMapOvr>
-    <a:masterClrMapping/>
-  </p:clrMapOvr>
-  <p:timing>
-    <p:tnLst>
-      <p:par>
-        <p:cTn id="1" dur="indefinite" restart="never" nodeType="tmRoot"/>
-      </p:par>
-    </p:tnLst>
-  </p:timing>
-</p:sld>
-</file>
-
 <file path=ppt/theme/theme1.xml><?xml version="1.0" encoding="utf-8"?>
 <a:theme xmlns:a="http://schemas.openxmlformats.org/drawingml/2006/main" name="Clarity">
   <a:themeElements>

</xml_diff>

<commit_message>
trusted advisor unsecured ports
</commit_message>
<xml_diff>
--- a/AWS_Solution_Architect.pptx
+++ b/AWS_Solution_Architect.pptx
@@ -327,7 +327,7 @@
           <a:p>
             <a:fld id="{93500CC2-B2B2-4C5E-B2DB-AB390A470EA1}" type="datetimeFigureOut">
               <a:rPr lang="en-GB" smtClean="0"/>
-              <a:t>01/12/2017</a:t>
+              <a:t>02/12/2017</a:t>
             </a:fld>
             <a:endParaRPr lang="en-GB"/>
           </a:p>
@@ -1447,7 +1447,7 @@
           <a:p>
             <a:fld id="{C64CD8ED-4DC0-4871-80D6-2E57B779E393}" type="datetime1">
               <a:rPr lang="en-US" smtClean="0"/>
-              <a:t>12/1/2017</a:t>
+              <a:t>12/2/2017</a:t>
             </a:fld>
             <a:endParaRPr lang="en-US"/>
           </a:p>
@@ -1647,7 +1647,7 @@
           <a:p>
             <a:fld id="{C74161E9-A9F7-4677-9FA9-680E6D35AA1C}" type="datetime1">
               <a:rPr lang="en-US" smtClean="0"/>
-              <a:t>12/1/2017</a:t>
+              <a:t>12/2/2017</a:t>
             </a:fld>
             <a:endParaRPr lang="en-US"/>
           </a:p>
@@ -1822,7 +1822,7 @@
           <a:p>
             <a:fld id="{3401F1B8-DD1B-4E00-A314-6CCBF5544006}" type="datetime1">
               <a:rPr lang="en-US" smtClean="0"/>
-              <a:t>12/1/2017</a:t>
+              <a:t>12/2/2017</a:t>
             </a:fld>
             <a:endParaRPr lang="en-US"/>
           </a:p>
@@ -1987,7 +1987,7 @@
           <a:p>
             <a:fld id="{20EE9FA0-450A-4DB0-B0AB-18DB89D35454}" type="datetime1">
               <a:rPr lang="en-US" smtClean="0"/>
-              <a:t>12/1/2017</a:t>
+              <a:t>12/2/2017</a:t>
             </a:fld>
             <a:endParaRPr lang="en-US"/>
           </a:p>
@@ -2235,7 +2235,7 @@
           <a:p>
             <a:fld id="{7EC56B97-FC1B-427F-9B0E-93A386441B29}" type="datetime1">
               <a:rPr lang="en-US" smtClean="0"/>
-              <a:t>12/1/2017</a:t>
+              <a:t>12/2/2017</a:t>
             </a:fld>
             <a:endParaRPr lang="en-US"/>
           </a:p>
@@ -2553,7 +2553,7 @@
           <a:p>
             <a:fld id="{FCE68E21-8370-4363-AC28-7FE6E76E54B1}" type="datetime1">
               <a:rPr lang="en-US" smtClean="0"/>
-              <a:t>12/1/2017</a:t>
+              <a:t>12/2/2017</a:t>
             </a:fld>
             <a:endParaRPr lang="en-US"/>
           </a:p>
@@ -3019,7 +3019,7 @@
           <a:p>
             <a:fld id="{DE21D7F6-C620-4327-ABD6-5649DCCC9D7B}" type="datetime1">
               <a:rPr lang="en-US" smtClean="0"/>
-              <a:t>12/1/2017</a:t>
+              <a:t>12/2/2017</a:t>
             </a:fld>
             <a:endParaRPr lang="en-US"/>
           </a:p>
@@ -3167,7 +3167,7 @@
           <a:p>
             <a:fld id="{B586EC62-343A-4449-AB6B-1C2E9E026A90}" type="datetime1">
               <a:rPr lang="en-US" smtClean="0"/>
-              <a:t>12/1/2017</a:t>
+              <a:t>12/2/2017</a:t>
             </a:fld>
             <a:endParaRPr lang="en-US"/>
           </a:p>
@@ -3257,7 +3257,7 @@
           <a:p>
             <a:fld id="{F496258A-B4CB-4F23-A4C0-6DF70BD096AD}" type="datetime1">
               <a:rPr lang="en-US" smtClean="0"/>
-              <a:t>12/1/2017</a:t>
+              <a:t>12/2/2017</a:t>
             </a:fld>
             <a:endParaRPr lang="en-US"/>
           </a:p>
@@ -3531,7 +3531,7 @@
           <a:p>
             <a:fld id="{3F51703E-8549-44B6-9C94-90BF3B139E17}" type="datetime1">
               <a:rPr lang="en-US" smtClean="0"/>
-              <a:t>12/1/2017</a:t>
+              <a:t>12/2/2017</a:t>
             </a:fld>
             <a:endParaRPr lang="en-US"/>
           </a:p>
@@ -3836,7 +3836,7 @@
           <a:p>
             <a:fld id="{DE6A5A91-5E4B-4C78-B9D4-B8726E898A2C}" type="datetime1">
               <a:rPr lang="en-US" smtClean="0"/>
-              <a:t>12/1/2017</a:t>
+              <a:t>12/2/2017</a:t>
             </a:fld>
             <a:endParaRPr lang="en-US"/>
           </a:p>
@@ -4134,7 +4134,7 @@
           <a:p>
             <a:fld id="{773D8793-05E7-4BFA-9CED-8F335001F9D9}" type="datetime1">
               <a:rPr lang="en-US" smtClean="0"/>
-              <a:t>12/1/2017</a:t>
+              <a:t>12/2/2017</a:t>
             </a:fld>
             <a:endParaRPr lang="en-US"/>
           </a:p>
@@ -4634,11 +4634,7 @@
           <a:p>
             <a:r>
               <a:rPr lang="en-US" dirty="0" smtClean="0"/>
-              <a:t>VPC - Public and Private VPC from </a:t>
-            </a:r>
-            <a:r>
-              <a:rPr lang="en-US" dirty="0" smtClean="0"/>
-              <a:t>Wizard (Scenario 2)</a:t>
+              <a:t>VPC - Public and Private VPC from Wizard (Scenario 2)</a:t>
             </a:r>
             <a:endParaRPr lang="en-US" dirty="0"/>
           </a:p>
@@ -4862,7 +4858,6 @@
               <a:rPr lang="en-GB" sz="1400" dirty="0"/>
               <a:t> to the virtual private gateway can also be part of the AWS VPN CloudHub.</a:t>
             </a:r>
-            <a:endParaRPr lang="en-GB" sz="1400" dirty="0"/>
           </a:p>
         </p:txBody>
       </p:sp>
@@ -4943,11 +4938,7 @@
           <a:p>
             <a:r>
               <a:rPr lang="en-US" dirty="0" smtClean="0"/>
-              <a:t>VPN </a:t>
-            </a:r>
-            <a:r>
-              <a:rPr lang="en-US" dirty="0" smtClean="0"/>
-              <a:t>CloudHub Continued</a:t>
+              <a:t>VPN CloudHub Continued</a:t>
             </a:r>
             <a:endParaRPr lang="en-US" dirty="0"/>
           </a:p>
@@ -5088,11 +5079,7 @@
           <a:p>
             <a:r>
               <a:rPr lang="en-US" dirty="0" smtClean="0"/>
-              <a:t>VPN </a:t>
-            </a:r>
-            <a:r>
-              <a:rPr lang="en-US" dirty="0" smtClean="0"/>
-              <a:t>Direct Connect (Without Internet)</a:t>
+              <a:t>VPN Direct Connect (Without Internet)</a:t>
             </a:r>
             <a:endParaRPr lang="en-US" dirty="0"/>
           </a:p>
@@ -5265,7 +5252,6 @@
               <a:rPr lang="en-GB" sz="1400" dirty="0"/>
               <a:t>for 10 gigabit Ethernet.</a:t>
             </a:r>
-            <a:endParaRPr lang="en-GB" sz="1400" dirty="0"/>
           </a:p>
         </p:txBody>
       </p:sp>
@@ -5348,11 +5334,7 @@
           <a:p>
             <a:r>
               <a:rPr lang="en-US" dirty="0" smtClean="0"/>
-              <a:t>VPN </a:t>
-            </a:r>
-            <a:r>
-              <a:rPr lang="en-US" dirty="0" smtClean="0"/>
-              <a:t>Direct Connect (Without Internet)</a:t>
+              <a:t>VPN Direct Connect (Without Internet)</a:t>
             </a:r>
             <a:endParaRPr lang="en-US" dirty="0"/>
           </a:p>
@@ -5493,11 +5475,7 @@
           <a:p>
             <a:r>
               <a:rPr lang="en-US" dirty="0" smtClean="0"/>
-              <a:t>VPN </a:t>
-            </a:r>
-            <a:r>
-              <a:rPr lang="en-US" dirty="0" smtClean="0"/>
-              <a:t>Direct Connect (Without Internet)</a:t>
+              <a:t>VPN Direct Connect (Without Internet)</a:t>
             </a:r>
             <a:endParaRPr lang="en-US" dirty="0"/>
           </a:p>
@@ -5757,11 +5735,7 @@
           <a:p>
             <a:r>
               <a:rPr lang="en-US" dirty="0" smtClean="0"/>
-              <a:t>VPN </a:t>
-            </a:r>
-            <a:r>
-              <a:rPr lang="en-US" dirty="0" smtClean="0"/>
-              <a:t>Direct Connect (Without Internet)</a:t>
+              <a:t>VPN Direct Connect (Without Internet)</a:t>
             </a:r>
             <a:endParaRPr lang="en-US" dirty="0"/>
           </a:p>
@@ -6504,7 +6478,6 @@
               <a:rPr lang="en-GB" sz="1400" dirty="0"/>
               <a:t>; however, instances in the VPC can communicate with each other via IPv6, and instances in the public subnet can communicate over the Internet via IPv6. </a:t>
             </a:r>
-            <a:endParaRPr lang="en-GB" sz="1400" dirty="0"/>
           </a:p>
         </p:txBody>
       </p:sp>
@@ -6971,11 +6944,7 @@
             </a:r>
             <a:r>
               <a:rPr lang="en-GB" sz="1400" dirty="0" smtClean="0"/>
-              <a:t>to an instance. The second ENI attached via CLI may not terminate when the instance is terminated from </a:t>
-            </a:r>
-            <a:r>
-              <a:rPr lang="en-GB" sz="1400" dirty="0" smtClean="0"/>
-              <a:t>console</a:t>
+              <a:t>to an instance. The second ENI attached via CLI may not terminate when the instance is terminated from console</a:t>
             </a:r>
           </a:p>
           <a:p>
@@ -6983,7 +6952,6 @@
               <a:rPr lang="en-GB" sz="1400" dirty="0" smtClean="0"/>
               <a:t>When 2 ENIs attached to an EC2 instance, AWS doesn’t allocate public IP address</a:t>
             </a:r>
-            <a:endParaRPr lang="en-GB" sz="1400" dirty="0" smtClean="0"/>
           </a:p>
           <a:p>
             <a:r>
@@ -9707,9 +9675,21 @@
           <a:p>
             <a:r>
               <a:rPr lang="en-GB" sz="1400" dirty="0" smtClean="0"/>
-              <a:t>Advice on security groups and what ports have unrestricted access</a:t>
-            </a:r>
-            <a:endParaRPr lang="en-GB" sz="1400" dirty="0"/>
+              <a:t>Advice on security groups and what </a:t>
+            </a:r>
+            <a:r>
+              <a:rPr lang="en-GB" sz="1400" b="1" dirty="0" smtClean="0">
+                <a:solidFill>
+                  <a:srgbClr val="FF0000"/>
+                </a:solidFill>
+              </a:rPr>
+              <a:t>ports have unrestricted access</a:t>
+            </a:r>
+            <a:endParaRPr lang="en-GB" sz="1400" b="1" dirty="0">
+              <a:solidFill>
+                <a:srgbClr val="FF0000"/>
+              </a:solidFill>
+            </a:endParaRPr>
           </a:p>
         </p:txBody>
       </p:sp>
@@ -10902,11 +10882,7 @@
           <a:p>
             <a:r>
               <a:rPr lang="en-US" sz="1600" dirty="0" smtClean="0"/>
-              <a:t>AWS online </a:t>
-            </a:r>
-            <a:r>
-              <a:rPr lang="en-US" sz="1600" dirty="0" smtClean="0"/>
-              <a:t>documentation</a:t>
+              <a:t>AWS online documentation</a:t>
             </a:r>
           </a:p>
           <a:p>
@@ -11012,11 +10988,7 @@
           <a:p>
             <a:r>
               <a:rPr lang="en-US" dirty="0" smtClean="0"/>
-              <a:t>VPC – </a:t>
-            </a:r>
-            <a:r>
-              <a:rPr lang="en-US" dirty="0" smtClean="0"/>
-              <a:t>NAT Instance (EC2)</a:t>
+              <a:t>VPC – NAT Instance (EC2)</a:t>
             </a:r>
             <a:endParaRPr lang="en-US" dirty="0"/>
           </a:p>
@@ -11278,7 +11250,6 @@
               <a:rPr lang="en-GB" sz="1400" dirty="0"/>
               <a:t>You can use a network ACL to control the traffic to and from the subnet in which the NAT gateway is located. The network ACL applies to the NAT gateway's traffic.</a:t>
             </a:r>
-            <a:endParaRPr lang="en-GB" sz="1400" dirty="0"/>
           </a:p>
         </p:txBody>
       </p:sp>
@@ -11418,7 +11389,6 @@
               <a:rPr lang="en-GB" sz="1400" dirty="0"/>
               <a:t> address</a:t>
             </a:r>
-            <a:endParaRPr lang="en-GB" sz="1400" dirty="0"/>
           </a:p>
         </p:txBody>
       </p:sp>
@@ -12200,11 +12170,7 @@
           <a:p>
             <a:r>
               <a:rPr lang="en-US" dirty="0" smtClean="0"/>
-              <a:t>VPC </a:t>
-            </a:r>
-            <a:r>
-              <a:rPr lang="en-US" dirty="0" smtClean="0"/>
-              <a:t>CIDR Block</a:t>
+              <a:t>VPC CIDR Block</a:t>
             </a:r>
             <a:endParaRPr lang="en-US" dirty="0"/>
           </a:p>
@@ -13745,7 +13711,6 @@
               <a:rPr lang="en-GB" sz="1400" dirty="0"/>
               <a:t>You can create a VPN connection to your remote network by using an Amazon EC2 instance in your VPC that's running a third party software VPN appliance. AWS does not provide or maintain third party software VPN appliances; however, you can choose from a range of products provided by partners and open source communities.</a:t>
             </a:r>
-            <a:endParaRPr lang="en-GB" sz="1400" dirty="0"/>
           </a:p>
         </p:txBody>
       </p:sp>
@@ -14878,7 +14843,6 @@
               <a:rPr lang="en-GB" sz="1400" dirty="0" smtClean="0"/>
               <a:t>. The same applies for AWS Direct Connect</a:t>
             </a:r>
-            <a:endParaRPr lang="en-GB" sz="1400" dirty="0" smtClean="0"/>
           </a:p>
           <a:p>
             <a:endParaRPr lang="en-GB" sz="1400" dirty="0" smtClean="0"/>
@@ -17000,15 +16964,7 @@
                   <a:srgbClr val="00B050"/>
                 </a:solidFill>
               </a:rPr>
-              <a:t>per region</a:t>
-            </a:r>
-            <a:r>
-              <a:rPr lang="en-GB" sz="1400" b="1" dirty="0">
-                <a:solidFill>
-                  <a:srgbClr val="00B050"/>
-                </a:solidFill>
-              </a:rPr>
-              <a:t>.</a:t>
+              <a:t>per region.</a:t>
             </a:r>
           </a:p>
           <a:p>
@@ -25103,11 +25059,7 @@
           <a:p>
             <a:r>
               <a:rPr lang="en-GB" sz="1400" dirty="0" smtClean="0"/>
-              <a:t>Bastion servers – can act as a proxy as </a:t>
-            </a:r>
-            <a:r>
-              <a:rPr lang="en-GB" sz="1400" dirty="0" smtClean="0"/>
-              <a:t>well</a:t>
+              <a:t>Bastion servers – can act as a proxy as well</a:t>
             </a:r>
           </a:p>
           <a:p>
@@ -25332,15 +25284,7 @@
           <a:p>
             <a:r>
               <a:rPr lang="en-US" dirty="0" smtClean="0"/>
-              <a:t>VPC </a:t>
-            </a:r>
-            <a:r>
-              <a:rPr lang="en-US" dirty="0" smtClean="0"/>
-              <a:t>– </a:t>
-            </a:r>
-            <a:r>
-              <a:rPr lang="en-US" dirty="0" smtClean="0"/>
-              <a:t>With Single Public Subnet (Scenario 1)</a:t>
+              <a:t>VPC – With Single Public Subnet (Scenario 1)</a:t>
             </a:r>
             <a:endParaRPr lang="en-US" dirty="0"/>
           </a:p>
@@ -25367,7 +25311,6 @@
               <a:rPr lang="en-GB" sz="1400" dirty="0"/>
               <a:t>The configuration for this scenario includes a virtual private cloud (VPC) with a single public subnet, and an Internet gateway to enable communication over the Internet. We recommend this configuration if you need to run a single-tier, public-facing web application, such as a blog or a simple website.</a:t>
             </a:r>
-            <a:endParaRPr lang="en-GB" sz="1400" dirty="0"/>
           </a:p>
         </p:txBody>
       </p:sp>
@@ -27297,11 +27240,7 @@
           <a:p>
             <a:r>
               <a:rPr lang="en-US" dirty="0" smtClean="0"/>
-              <a:t>VPC - Public and Private VPC from </a:t>
-            </a:r>
-            <a:r>
-              <a:rPr lang="en-US" dirty="0" smtClean="0"/>
-              <a:t>Wizard (Scenario 2)</a:t>
+              <a:t>VPC - Public and Private VPC from Wizard (Scenario 2)</a:t>
             </a:r>
             <a:endParaRPr lang="en-US" dirty="0"/>
           </a:p>
@@ -27376,7 +27315,6 @@
               <a:rPr lang="en-GB" sz="1400" dirty="0"/>
               <a:t>. The database servers can connect to the Internet for software updates using the NAT gateway, but the Internet cannot establish connections to the database servers.</a:t>
             </a:r>
-            <a:endParaRPr lang="en-GB" sz="1400" dirty="0"/>
           </a:p>
         </p:txBody>
       </p:sp>

</xml_diff>